<commit_message>
Added challenge and Presentation to W5-S2
</commit_message>
<xml_diff>
--- a/week-5/W5-S2-NodeJS/W5-S2-NodeJS.pptx
+++ b/week-5/W5-S2-NodeJS/W5-S2-NodeJS.pptx
@@ -5,10 +5,10 @@
     <p:sldMasterId id="2147483968" r:id="rId1"/>
   </p:sldMasterIdLst>
   <p:notesMasterIdLst>
-    <p:notesMasterId r:id="rId15"/>
+    <p:notesMasterId r:id="rId22"/>
   </p:notesMasterIdLst>
   <p:handoutMasterIdLst>
-    <p:handoutMasterId r:id="rId16"/>
+    <p:handoutMasterId r:id="rId23"/>
   </p:handoutMasterIdLst>
   <p:sldIdLst>
     <p:sldId id="256" r:id="rId2"/>
@@ -22,8 +22,15 @@
     <p:sldId id="288" r:id="rId10"/>
     <p:sldId id="289" r:id="rId11"/>
     <p:sldId id="290" r:id="rId12"/>
-    <p:sldId id="292" r:id="rId13"/>
-    <p:sldId id="264" r:id="rId14"/>
+    <p:sldId id="297" r:id="rId13"/>
+    <p:sldId id="298" r:id="rId14"/>
+    <p:sldId id="299" r:id="rId15"/>
+    <p:sldId id="300" r:id="rId16"/>
+    <p:sldId id="301" r:id="rId17"/>
+    <p:sldId id="302" r:id="rId18"/>
+    <p:sldId id="303" r:id="rId19"/>
+    <p:sldId id="292" r:id="rId20"/>
+    <p:sldId id="264" r:id="rId21"/>
   </p:sldIdLst>
   <p:sldSz cx="12192000" cy="6858000"/>
   <p:notesSz cx="6858000" cy="9144000"/>
@@ -138,6 +145,13 @@
             <p14:sldId id="288"/>
             <p14:sldId id="289"/>
             <p14:sldId id="290"/>
+            <p14:sldId id="297"/>
+            <p14:sldId id="298"/>
+            <p14:sldId id="299"/>
+            <p14:sldId id="300"/>
+            <p14:sldId id="301"/>
+            <p14:sldId id="302"/>
+            <p14:sldId id="303"/>
             <p14:sldId id="292"/>
             <p14:sldId id="264"/>
           </p14:sldIdLst>
@@ -451,7 +465,7 @@
           <a:p>
             <a:fld id="{AA884A5F-B9F5-9B43-BE5B-EBBCD5646595}" type="datetimeFigureOut">
               <a:rPr lang="en-US" smtClean="0"/>
-              <a:t>10/8/24</a:t>
+              <a:t>10/12/24</a:t>
             </a:fld>
             <a:endParaRPr lang="en-US"/>
           </a:p>
@@ -1372,7 +1386,7 @@
           <a:p>
             <a:fld id="{F6FA2B21-3FCD-4721-B95C-427943F61125}" type="datetime1">
               <a:rPr lang="en-US" smtClean="0"/>
-              <a:t>10/8/24</a:t>
+              <a:t>10/12/24</a:t>
             </a:fld>
             <a:endParaRPr lang="en-US"/>
           </a:p>
@@ -1635,7 +1649,7 @@
           <a:p>
             <a:fld id="{F6FA2B21-3FCD-4721-B95C-427943F61125}" type="datetime1">
               <a:rPr lang="en-US" smtClean="0"/>
-              <a:t>10/8/24</a:t>
+              <a:t>10/12/24</a:t>
             </a:fld>
             <a:endParaRPr lang="en-US"/>
           </a:p>
@@ -1871,7 +1885,7 @@
           <a:p>
             <a:fld id="{F6FA2B21-3FCD-4721-B95C-427943F61125}" type="datetime1">
               <a:rPr lang="en-US" smtClean="0"/>
-              <a:t>10/8/24</a:t>
+              <a:t>10/12/24</a:t>
             </a:fld>
             <a:endParaRPr lang="en-US"/>
           </a:p>
@@ -2199,7 +2213,7 @@
           <a:p>
             <a:fld id="{EA0C0817-A112-4847-8014-A94B7D2A4EA3}" type="datetime1">
               <a:rPr lang="en-US" smtClean="0"/>
-              <a:t>10/8/24</a:t>
+              <a:t>10/12/24</a:t>
             </a:fld>
             <a:endParaRPr lang="en-US" dirty="0"/>
           </a:p>
@@ -2513,7 +2527,7 @@
           <a:p>
             <a:fld id="{7332B432-ACDA-4023-A761-2BAB76577B62}" type="datetime1">
               <a:rPr lang="en-US" smtClean="0"/>
-              <a:t>10/8/24</a:t>
+              <a:t>10/12/24</a:t>
             </a:fld>
             <a:endParaRPr lang="en-US"/>
           </a:p>
@@ -2820,7 +2834,7 @@
           <a:p>
             <a:fld id="{D9C646AA-F36E-4540-911D-FFFC0A0EF24A}" type="datetime1">
               <a:rPr lang="en-US" smtClean="0"/>
-              <a:t>10/8/24</a:t>
+              <a:t>10/12/24</a:t>
             </a:fld>
             <a:endParaRPr lang="en-US" dirty="0"/>
           </a:p>
@@ -3122,7 +3136,7 @@
           <a:p>
             <a:fld id="{69186D26-FA5F-4637-B602-B7C2DC34CFD4}" type="datetime1">
               <a:rPr lang="en-US" smtClean="0"/>
-              <a:t>10/8/24</a:t>
+              <a:t>10/12/24</a:t>
             </a:fld>
             <a:endParaRPr lang="en-US"/>
           </a:p>
@@ -3544,7 +3558,7 @@
           <a:p>
             <a:fld id="{8A7F15D8-96D1-4781-BC50-CA8A088B2FE4}" type="datetime1">
               <a:rPr lang="en-US" smtClean="0"/>
-              <a:t>10/8/24</a:t>
+              <a:t>10/12/24</a:t>
             </a:fld>
             <a:endParaRPr lang="en-US"/>
           </a:p>
@@ -3706,7 +3720,7 @@
           <a:p>
             <a:fld id="{F9A96C99-B8F8-4528-BD05-0E16E943DC09}" type="datetime1">
               <a:rPr lang="en-US" smtClean="0"/>
-              <a:t>10/8/24</a:t>
+              <a:t>10/12/24</a:t>
             </a:fld>
             <a:endParaRPr lang="en-US"/>
           </a:p>
@@ -3801,7 +3815,7 @@
           <a:p>
             <a:fld id="{03636942-C211-4B28-8DBD-C953E00AF71B}" type="datetime1">
               <a:rPr lang="en-US" smtClean="0"/>
-              <a:t>10/8/24</a:t>
+              <a:t>10/12/24</a:t>
             </a:fld>
             <a:endParaRPr lang="en-US"/>
           </a:p>
@@ -4179,7 +4193,7 @@
           <a:p>
             <a:fld id="{7E8D12A6-918A-48BD-8CB9-CA713993B0EA}" type="datetime1">
               <a:rPr lang="en-US" smtClean="0"/>
-              <a:t>10/8/24</a:t>
+              <a:t>10/12/24</a:t>
             </a:fld>
             <a:endParaRPr lang="en-US"/>
           </a:p>
@@ -4468,7 +4482,7 @@
           <a:p>
             <a:fld id="{F6FA2B21-3FCD-4721-B95C-427943F61125}" type="datetime1">
               <a:rPr lang="en-US" smtClean="0"/>
-              <a:t>10/8/24</a:t>
+              <a:t>10/12/24</a:t>
             </a:fld>
             <a:endParaRPr lang="en-US"/>
           </a:p>
@@ -4680,7 +4694,7 @@
           <a:p>
             <a:fld id="{F6FA2B21-3FCD-4721-B95C-427943F61125}" type="datetime1">
               <a:rPr lang="en-US" smtClean="0"/>
-              <a:t>10/8/24</a:t>
+              <a:t>10/12/24</a:t>
             </a:fld>
             <a:endParaRPr lang="en-US"/>
           </a:p>
@@ -5384,7 +5398,7 @@
                   <a:schemeClr val="tx1"/>
                 </a:solidFill>
               </a:rPr>
-              <a:t>HTTP and 3rd Party APIs</a:t>
+              <a:t>Introduction to NodeJS and Debugging</a:t>
             </a:r>
             <a:endParaRPr lang="en-US" sz="4000" dirty="0">
               <a:solidFill>
@@ -5500,7 +5514,7 @@
           <a:p>
             <a:r>
               <a:rPr lang="en-GB" dirty="0"/>
-              <a:t>Using JSON Data in JavaScript</a:t>
+              <a:t>Destructuring</a:t>
             </a:r>
           </a:p>
         </p:txBody>
@@ -5533,17 +5547,13 @@
           </a:bodyPr>
           <a:lstStyle/>
           <a:p>
-            <a:pPr>
-              <a:buFont typeface="Arial" panose="020B0604020202020204" pitchFamily="34" charset="0"/>
-              <a:buChar char="•"/>
-            </a:pPr>
             <a:r>
               <a:rPr lang="en-GB" b="1" dirty="0"/>
-              <a:t>Parsing JSON</a:t>
-            </a:r>
-            <a:r>
-              <a:rPr lang="en-GB" dirty="0"/>
-              <a:t>:</a:t>
+              <a:t>Purpose</a:t>
+            </a:r>
+            <a:r>
+              <a:rPr lang="en-GB" dirty="0"/>
+              <a:t>: </a:t>
             </a:r>
             <a:br>
               <a:rPr lang="en-GB" dirty="0"/>
@@ -5553,27 +5563,28 @@
             </a:br>
             <a:r>
               <a:rPr lang="en-GB" dirty="0"/>
-              <a:t>After fetching the data, you can access it in your JavaScript code.</a:t>
-            </a:r>
-          </a:p>
-          <a:p>
-            <a:pPr>
-              <a:buFont typeface="Arial" panose="020B0604020202020204" pitchFamily="34" charset="0"/>
-              <a:buChar char="•"/>
-            </a:pPr>
-            <a:r>
-              <a:rPr lang="en-GB" dirty="0"/>
-              <a:t>Example of accessing fields in JSON</a:t>
-            </a:r>
+              <a:t>Extract values from objects and arrays.</a:t>
+            </a:r>
+            <a:br>
+              <a:rPr lang="en-GB" dirty="0"/>
+            </a:br>
+            <a:endParaRPr lang="en-GB" dirty="0"/>
+          </a:p>
+          <a:p>
+            <a:r>
+              <a:rPr lang="en-GB" b="1" dirty="0"/>
+              <a:t>Example</a:t>
+            </a:r>
+            <a:endParaRPr lang="en-GB" dirty="0"/>
           </a:p>
         </p:txBody>
       </p:sp>
       <p:pic>
         <p:nvPicPr>
-          <p:cNvPr id="5" name="Picture 4" descr="A black background with white text&#10;&#10;Description automatically generated">
+          <p:cNvPr id="6" name="Picture 5" descr="A black background with white text&#10;&#10;Description automatically generated">
             <a:extLst>
               <a:ext uri="{FF2B5EF4-FFF2-40B4-BE49-F238E27FC236}">
-                <a16:creationId xmlns:a16="http://schemas.microsoft.com/office/drawing/2014/main" id="{8B856F2D-38CB-BE08-E4E4-D10FCB5091F3}"/>
+                <a16:creationId xmlns:a16="http://schemas.microsoft.com/office/drawing/2014/main" id="{38312390-81A2-8E0C-20E4-9BD2E2556574}"/>
               </a:ext>
             </a:extLst>
           </p:cNvPr>
@@ -5590,8 +5601,8 @@
         </p:blipFill>
         <p:spPr>
           <a:xfrm>
-            <a:off x="6096000" y="3841454"/>
-            <a:ext cx="4800600" cy="876300"/>
+            <a:off x="6188419" y="3300046"/>
+            <a:ext cx="4826000" cy="1193800"/>
           </a:xfrm>
           <a:prstGeom prst="rect">
             <a:avLst/>
@@ -5664,7 +5675,7 @@
           <a:p>
             <a:r>
               <a:rPr lang="en-GB" dirty="0"/>
-              <a:t>Updating DOM Elements with JSON Data</a:t>
+              <a:t>Arrow Functions</a:t>
             </a:r>
           </a:p>
         </p:txBody>
@@ -5697,17 +5708,13 @@
           </a:bodyPr>
           <a:lstStyle/>
           <a:p>
-            <a:pPr>
-              <a:buFont typeface="Arial" panose="020B0604020202020204" pitchFamily="34" charset="0"/>
-              <a:buChar char="•"/>
-            </a:pPr>
             <a:r>
               <a:rPr lang="en-GB" b="1" dirty="0"/>
-              <a:t>DOM Manipulation</a:t>
-            </a:r>
-            <a:r>
-              <a:rPr lang="en-GB" dirty="0"/>
-              <a:t>:</a:t>
+              <a:t>Definition</a:t>
+            </a:r>
+            <a:r>
+              <a:rPr lang="en-GB" dirty="0"/>
+              <a:t>: </a:t>
             </a:r>
             <a:br>
               <a:rPr lang="en-GB" dirty="0"/>
@@ -5717,48 +5724,28 @@
             </a:br>
             <a:r>
               <a:rPr lang="en-GB" dirty="0"/>
-              <a:t>Use JSON data to update elements on the web page dynamically.</a:t>
+              <a:t>A shorter syntax for writing functions.</a:t>
             </a:r>
             <a:br>
               <a:rPr lang="en-GB" dirty="0"/>
             </a:br>
-            <a:br>
-              <a:rPr lang="en-GB" dirty="0"/>
-            </a:br>
+            <a:endParaRPr lang="en-GB" dirty="0"/>
+          </a:p>
+          <a:p>
             <a:r>
               <a:rPr lang="en-GB" b="1" dirty="0"/>
-              <a:t>Practical Example</a:t>
-            </a:r>
-            <a:r>
-              <a:rPr lang="en-GB" dirty="0"/>
-              <a:t>:</a:t>
-            </a:r>
-          </a:p>
-          <a:p>
-            <a:pPr marL="742950" lvl="1" indent="-285750">
-              <a:buFont typeface="Arial" panose="020B0604020202020204" pitchFamily="34" charset="0"/>
-              <a:buChar char="•"/>
-            </a:pPr>
-            <a:r>
-              <a:rPr lang="en-GB" dirty="0"/>
-              <a:t>Fetch weather data and update a weather dashboard.</a:t>
-            </a:r>
-          </a:p>
-          <a:p>
-            <a:pPr>
-              <a:buFont typeface="Arial" panose="020B0604020202020204" pitchFamily="34" charset="0"/>
-              <a:buChar char="•"/>
-            </a:pPr>
+              <a:t>Example</a:t>
+            </a:r>
             <a:endParaRPr lang="en-GB" dirty="0"/>
           </a:p>
         </p:txBody>
       </p:sp>
       <p:pic>
         <p:nvPicPr>
-          <p:cNvPr id="5" name="Picture 4">
+          <p:cNvPr id="6" name="Picture 5" descr="A black background with white text&#10;&#10;Description automatically generated">
             <a:extLst>
               <a:ext uri="{FF2B5EF4-FFF2-40B4-BE49-F238E27FC236}">
-                <a16:creationId xmlns:a16="http://schemas.microsoft.com/office/drawing/2014/main" id="{8C93400A-D04C-2DC3-6D6A-AA7D8B3D403F}"/>
+                <a16:creationId xmlns:a16="http://schemas.microsoft.com/office/drawing/2014/main" id="{03FAC436-5965-674F-65A5-09E2D0A023C3}"/>
               </a:ext>
             </a:extLst>
           </p:cNvPr>
@@ -5775,8 +5762,8 @@
         </p:blipFill>
         <p:spPr>
           <a:xfrm>
-            <a:off x="763799" y="5302250"/>
-            <a:ext cx="6375400" cy="558800"/>
+            <a:off x="5448789" y="3352800"/>
+            <a:ext cx="5092700" cy="863600"/>
           </a:xfrm>
           <a:prstGeom prst="rect">
             <a:avLst/>
@@ -5804,6 +5791,1250 @@
         <p:cNvPr id="1" name="">
           <a:extLst>
             <a:ext uri="{FF2B5EF4-FFF2-40B4-BE49-F238E27FC236}">
+              <a16:creationId xmlns:a16="http://schemas.microsoft.com/office/drawing/2014/main" id="{74459EF7-C16A-C86E-9F63-94588FE8FC77}"/>
+            </a:ext>
+          </a:extLst>
+        </p:cNvPr>
+        <p:cNvGrpSpPr/>
+        <p:nvPr/>
+      </p:nvGrpSpPr>
+      <p:grpSpPr>
+        <a:xfrm>
+          <a:off x="0" y="0"/>
+          <a:ext cx="0" cy="0"/>
+          <a:chOff x="0" y="0"/>
+          <a:chExt cx="0" cy="0"/>
+        </a:xfrm>
+      </p:grpSpPr>
+      <p:sp>
+        <p:nvSpPr>
+          <p:cNvPr id="2" name="Title 1">
+            <a:extLst>
+              <a:ext uri="{FF2B5EF4-FFF2-40B4-BE49-F238E27FC236}">
+                <a16:creationId xmlns:a16="http://schemas.microsoft.com/office/drawing/2014/main" id="{64F0B85C-F220-645E-DB09-FDD9CABDB5FD}"/>
+              </a:ext>
+            </a:extLst>
+          </p:cNvPr>
+          <p:cNvSpPr>
+            <a:spLocks noGrp="1"/>
+          </p:cNvSpPr>
+          <p:nvPr>
+            <p:ph type="title"/>
+          </p:nvPr>
+        </p:nvSpPr>
+        <p:spPr>
+          <a:xfrm>
+            <a:off x="581193" y="729658"/>
+            <a:ext cx="11029616" cy="988332"/>
+          </a:xfrm>
+        </p:spPr>
+        <p:txBody>
+          <a:bodyPr anchor="b">
+            <a:normAutofit/>
+          </a:bodyPr>
+          <a:lstStyle/>
+          <a:p>
+            <a:r>
+              <a:rPr lang="en-GB" dirty="0"/>
+              <a:t>Spread Operator</a:t>
+            </a:r>
+          </a:p>
+        </p:txBody>
+      </p:sp>
+      <p:sp>
+        <p:nvSpPr>
+          <p:cNvPr id="3" name="Content Placeholder 2">
+            <a:extLst>
+              <a:ext uri="{FF2B5EF4-FFF2-40B4-BE49-F238E27FC236}">
+                <a16:creationId xmlns:a16="http://schemas.microsoft.com/office/drawing/2014/main" id="{C32DC3E0-7854-2B55-40BD-E0A769D32BCC}"/>
+              </a:ext>
+            </a:extLst>
+          </p:cNvPr>
+          <p:cNvSpPr>
+            <a:spLocks noGrp="1"/>
+          </p:cNvSpPr>
+          <p:nvPr>
+            <p:ph sz="half" idx="1"/>
+          </p:nvPr>
+        </p:nvSpPr>
+        <p:spPr>
+          <a:xfrm>
+            <a:off x="581193" y="2228003"/>
+            <a:ext cx="5422390" cy="3633047"/>
+          </a:xfrm>
+        </p:spPr>
+        <p:txBody>
+          <a:bodyPr anchor="ctr">
+            <a:normAutofit/>
+          </a:bodyPr>
+          <a:lstStyle/>
+          <a:p>
+            <a:r>
+              <a:rPr lang="en-GB" b="1" dirty="0"/>
+              <a:t>Definition</a:t>
+            </a:r>
+            <a:r>
+              <a:rPr lang="en-GB" dirty="0"/>
+              <a:t>: </a:t>
+            </a:r>
+            <a:br>
+              <a:rPr lang="en-GB" dirty="0"/>
+            </a:br>
+            <a:br>
+              <a:rPr lang="en-GB" dirty="0"/>
+            </a:br>
+            <a:r>
+              <a:rPr lang="en-GB" dirty="0"/>
+              <a:t>Expands </a:t>
+            </a:r>
+            <a:r>
+              <a:rPr lang="en-GB" dirty="0" err="1"/>
+              <a:t>iterable</a:t>
+            </a:r>
+            <a:r>
+              <a:rPr lang="en-GB" dirty="0"/>
+              <a:t> elements (arrays, objects) into individual elements.</a:t>
+            </a:r>
+            <a:br>
+              <a:rPr lang="en-GB" dirty="0"/>
+            </a:br>
+            <a:endParaRPr lang="en-GB" dirty="0"/>
+          </a:p>
+          <a:p>
+            <a:r>
+              <a:rPr lang="en-GB" b="1" dirty="0"/>
+              <a:t>Example</a:t>
+            </a:r>
+            <a:r>
+              <a:rPr lang="en-GB" dirty="0"/>
+              <a:t>:</a:t>
+            </a:r>
+          </a:p>
+        </p:txBody>
+      </p:sp>
+      <p:pic>
+        <p:nvPicPr>
+          <p:cNvPr id="5" name="Picture 4" descr="A black background with white and pink numbers&#10;&#10;Description automatically generated">
+            <a:extLst>
+              <a:ext uri="{FF2B5EF4-FFF2-40B4-BE49-F238E27FC236}">
+                <a16:creationId xmlns:a16="http://schemas.microsoft.com/office/drawing/2014/main" id="{4D0C8A15-5D8E-0F33-AD61-6C6AC13F350F}"/>
+              </a:ext>
+            </a:extLst>
+          </p:cNvPr>
+          <p:cNvPicPr>
+            <a:picLocks noChangeAspect="1"/>
+          </p:cNvPicPr>
+          <p:nvPr/>
+        </p:nvPicPr>
+        <p:blipFill>
+          <a:blip r:embed="rId2"/>
+          <a:stretch>
+            <a:fillRect/>
+          </a:stretch>
+        </p:blipFill>
+        <p:spPr>
+          <a:xfrm>
+            <a:off x="6003583" y="3519365"/>
+            <a:ext cx="5829300" cy="850900"/>
+          </a:xfrm>
+          <a:prstGeom prst="rect">
+            <a:avLst/>
+          </a:prstGeom>
+        </p:spPr>
+      </p:pic>
+    </p:spTree>
+    <p:extLst>
+      <p:ext uri="{BB962C8B-B14F-4D97-AF65-F5344CB8AC3E}">
+        <p14:creationId xmlns:p14="http://schemas.microsoft.com/office/powerpoint/2010/main" val="3256170745"/>
+      </p:ext>
+    </p:extLst>
+  </p:cSld>
+  <p:clrMapOvr>
+    <a:masterClrMapping/>
+  </p:clrMapOvr>
+</p:sld>
+</file>
+
+<file path=ppt/slides/slide13.xml><?xml version="1.0" encoding="utf-8"?>
+<p:sld xmlns:a="http://schemas.openxmlformats.org/drawingml/2006/main" xmlns:r="http://schemas.openxmlformats.org/officeDocument/2006/relationships" xmlns:p="http://schemas.openxmlformats.org/presentationml/2006/main">
+  <p:cSld>
+    <p:spTree>
+      <p:nvGrpSpPr>
+        <p:cNvPr id="1" name="">
+          <a:extLst>
+            <a:ext uri="{FF2B5EF4-FFF2-40B4-BE49-F238E27FC236}">
+              <a16:creationId xmlns:a16="http://schemas.microsoft.com/office/drawing/2014/main" id="{3BAA00FB-C44E-8663-0401-70A2AD2ECDF6}"/>
+            </a:ext>
+          </a:extLst>
+        </p:cNvPr>
+        <p:cNvGrpSpPr/>
+        <p:nvPr/>
+      </p:nvGrpSpPr>
+      <p:grpSpPr>
+        <a:xfrm>
+          <a:off x="0" y="0"/>
+          <a:ext cx="0" cy="0"/>
+          <a:chOff x="0" y="0"/>
+          <a:chExt cx="0" cy="0"/>
+        </a:xfrm>
+      </p:grpSpPr>
+      <p:sp>
+        <p:nvSpPr>
+          <p:cNvPr id="2" name="Title 1">
+            <a:extLst>
+              <a:ext uri="{FF2B5EF4-FFF2-40B4-BE49-F238E27FC236}">
+                <a16:creationId xmlns:a16="http://schemas.microsoft.com/office/drawing/2014/main" id="{B011BB96-C36D-4C18-0321-6229ECB52FFB}"/>
+              </a:ext>
+            </a:extLst>
+          </p:cNvPr>
+          <p:cNvSpPr>
+            <a:spLocks noGrp="1"/>
+          </p:cNvSpPr>
+          <p:nvPr>
+            <p:ph type="title"/>
+          </p:nvPr>
+        </p:nvSpPr>
+        <p:spPr>
+          <a:xfrm>
+            <a:off x="581193" y="729658"/>
+            <a:ext cx="11029616" cy="988332"/>
+          </a:xfrm>
+        </p:spPr>
+        <p:txBody>
+          <a:bodyPr anchor="b">
+            <a:normAutofit/>
+          </a:bodyPr>
+          <a:lstStyle/>
+          <a:p>
+            <a:r>
+              <a:rPr lang="en-GB" dirty="0"/>
+              <a:t>Var vs Let vs </a:t>
+            </a:r>
+            <a:r>
+              <a:rPr lang="en-GB" dirty="0" err="1"/>
+              <a:t>Const</a:t>
+            </a:r>
+            <a:endParaRPr lang="en-GB" dirty="0"/>
+          </a:p>
+        </p:txBody>
+      </p:sp>
+      <p:sp>
+        <p:nvSpPr>
+          <p:cNvPr id="3" name="Content Placeholder 2">
+            <a:extLst>
+              <a:ext uri="{FF2B5EF4-FFF2-40B4-BE49-F238E27FC236}">
+                <a16:creationId xmlns:a16="http://schemas.microsoft.com/office/drawing/2014/main" id="{E1455D4B-0544-4301-C47B-5173B7AFC389}"/>
+              </a:ext>
+            </a:extLst>
+          </p:cNvPr>
+          <p:cNvSpPr>
+            <a:spLocks noGrp="1"/>
+          </p:cNvSpPr>
+          <p:nvPr>
+            <p:ph sz="half" idx="1"/>
+          </p:nvPr>
+        </p:nvSpPr>
+        <p:spPr>
+          <a:xfrm>
+            <a:off x="581193" y="2228003"/>
+            <a:ext cx="7331884" cy="3633047"/>
+          </a:xfrm>
+        </p:spPr>
+        <p:txBody>
+          <a:bodyPr anchor="ctr">
+            <a:normAutofit/>
+          </a:bodyPr>
+          <a:lstStyle/>
+          <a:p>
+            <a:r>
+              <a:rPr lang="en-GB" b="1" dirty="0"/>
+              <a:t>Differences</a:t>
+            </a:r>
+            <a:r>
+              <a:rPr lang="en-GB" dirty="0"/>
+              <a:t>:</a:t>
+            </a:r>
+            <a:br>
+              <a:rPr lang="en-GB" dirty="0"/>
+            </a:br>
+            <a:br>
+              <a:rPr lang="en-GB" dirty="0"/>
+            </a:br>
+            <a:r>
+              <a:rPr lang="en-GB" dirty="0"/>
+              <a:t>var: Function-scoped, can be re-declared.</a:t>
+            </a:r>
+            <a:br>
+              <a:rPr lang="en-GB" dirty="0"/>
+            </a:br>
+            <a:br>
+              <a:rPr lang="en-GB" dirty="0"/>
+            </a:br>
+            <a:r>
+              <a:rPr lang="en-GB" dirty="0"/>
+              <a:t>let: Block-scoped, cannot be re-declared.</a:t>
+            </a:r>
+            <a:br>
+              <a:rPr lang="en-GB" dirty="0"/>
+            </a:br>
+            <a:br>
+              <a:rPr lang="en-GB" dirty="0"/>
+            </a:br>
+            <a:r>
+              <a:rPr lang="en-GB" dirty="0" err="1"/>
+              <a:t>const</a:t>
+            </a:r>
+            <a:r>
+              <a:rPr lang="en-GB" dirty="0"/>
+              <a:t>: Block-scoped, cannot be reassigned or re-declared.</a:t>
+            </a:r>
+          </a:p>
+          <a:p>
+            <a:r>
+              <a:rPr lang="en-GB" b="1" dirty="0"/>
+              <a:t>Example</a:t>
+            </a:r>
+            <a:r>
+              <a:rPr lang="en-GB" dirty="0"/>
+              <a:t>:</a:t>
+            </a:r>
+          </a:p>
+        </p:txBody>
+      </p:sp>
+      <p:pic>
+        <p:nvPicPr>
+          <p:cNvPr id="6" name="Picture 5" descr="A black background with white text&#10;&#10;Description automatically generated">
+            <a:extLst>
+              <a:ext uri="{FF2B5EF4-FFF2-40B4-BE49-F238E27FC236}">
+                <a16:creationId xmlns:a16="http://schemas.microsoft.com/office/drawing/2014/main" id="{21E50910-6794-EACB-6C35-B65DB1A1F9D8}"/>
+              </a:ext>
+            </a:extLst>
+          </p:cNvPr>
+          <p:cNvPicPr>
+            <a:picLocks noChangeAspect="1"/>
+          </p:cNvPicPr>
+          <p:nvPr/>
+        </p:nvPicPr>
+        <p:blipFill>
+          <a:blip r:embed="rId2"/>
+          <a:stretch>
+            <a:fillRect/>
+          </a:stretch>
+        </p:blipFill>
+        <p:spPr>
+          <a:xfrm>
+            <a:off x="7338158" y="3159852"/>
+            <a:ext cx="3745602" cy="1980159"/>
+          </a:xfrm>
+          <a:prstGeom prst="rect">
+            <a:avLst/>
+          </a:prstGeom>
+        </p:spPr>
+      </p:pic>
+    </p:spTree>
+    <p:extLst>
+      <p:ext uri="{BB962C8B-B14F-4D97-AF65-F5344CB8AC3E}">
+        <p14:creationId xmlns:p14="http://schemas.microsoft.com/office/powerpoint/2010/main" val="783291687"/>
+      </p:ext>
+    </p:extLst>
+  </p:cSld>
+  <p:clrMapOvr>
+    <a:masterClrMapping/>
+  </p:clrMapOvr>
+</p:sld>
+</file>
+
+<file path=ppt/slides/slide14.xml><?xml version="1.0" encoding="utf-8"?>
+<p:sld xmlns:a="http://schemas.openxmlformats.org/drawingml/2006/main" xmlns:r="http://schemas.openxmlformats.org/officeDocument/2006/relationships" xmlns:p="http://schemas.openxmlformats.org/presentationml/2006/main">
+  <p:cSld>
+    <p:spTree>
+      <p:nvGrpSpPr>
+        <p:cNvPr id="1" name="">
+          <a:extLst>
+            <a:ext uri="{FF2B5EF4-FFF2-40B4-BE49-F238E27FC236}">
+              <a16:creationId xmlns:a16="http://schemas.microsoft.com/office/drawing/2014/main" id="{B4AFFE1C-AE1D-2E45-AA23-0260A95B84F5}"/>
+            </a:ext>
+          </a:extLst>
+        </p:cNvPr>
+        <p:cNvGrpSpPr/>
+        <p:nvPr/>
+      </p:nvGrpSpPr>
+      <p:grpSpPr>
+        <a:xfrm>
+          <a:off x="0" y="0"/>
+          <a:ext cx="0" cy="0"/>
+          <a:chOff x="0" y="0"/>
+          <a:chExt cx="0" cy="0"/>
+        </a:xfrm>
+      </p:grpSpPr>
+      <p:sp>
+        <p:nvSpPr>
+          <p:cNvPr id="2" name="Title 1">
+            <a:extLst>
+              <a:ext uri="{FF2B5EF4-FFF2-40B4-BE49-F238E27FC236}">
+                <a16:creationId xmlns:a16="http://schemas.microsoft.com/office/drawing/2014/main" id="{7EFB1FF5-D12D-7974-A943-A92F8CC7B364}"/>
+              </a:ext>
+            </a:extLst>
+          </p:cNvPr>
+          <p:cNvSpPr>
+            <a:spLocks noGrp="1"/>
+          </p:cNvSpPr>
+          <p:nvPr>
+            <p:ph type="title"/>
+          </p:nvPr>
+        </p:nvSpPr>
+        <p:spPr>
+          <a:xfrm>
+            <a:off x="581193" y="729658"/>
+            <a:ext cx="11029616" cy="988332"/>
+          </a:xfrm>
+        </p:spPr>
+        <p:txBody>
+          <a:bodyPr anchor="b">
+            <a:normAutofit/>
+          </a:bodyPr>
+          <a:lstStyle/>
+          <a:p>
+            <a:r>
+              <a:rPr lang="en-GB" dirty="0"/>
+              <a:t>ES6 Modules</a:t>
+            </a:r>
+          </a:p>
+        </p:txBody>
+      </p:sp>
+      <p:sp>
+        <p:nvSpPr>
+          <p:cNvPr id="3" name="Content Placeholder 2">
+            <a:extLst>
+              <a:ext uri="{FF2B5EF4-FFF2-40B4-BE49-F238E27FC236}">
+                <a16:creationId xmlns:a16="http://schemas.microsoft.com/office/drawing/2014/main" id="{55CBAF9F-6C4C-FAA5-866F-33D25E063EBD}"/>
+              </a:ext>
+            </a:extLst>
+          </p:cNvPr>
+          <p:cNvSpPr>
+            <a:spLocks noGrp="1"/>
+          </p:cNvSpPr>
+          <p:nvPr>
+            <p:ph sz="half" idx="1"/>
+          </p:nvPr>
+        </p:nvSpPr>
+        <p:spPr>
+          <a:xfrm>
+            <a:off x="581193" y="2228003"/>
+            <a:ext cx="7331884" cy="3633047"/>
+          </a:xfrm>
+        </p:spPr>
+        <p:txBody>
+          <a:bodyPr anchor="ctr">
+            <a:normAutofit/>
+          </a:bodyPr>
+          <a:lstStyle/>
+          <a:p>
+            <a:r>
+              <a:rPr lang="en-GB" b="1" dirty="0"/>
+              <a:t>Importing and Exporting Modules</a:t>
+            </a:r>
+            <a:r>
+              <a:rPr lang="en-GB" dirty="0"/>
+              <a:t>:</a:t>
+            </a:r>
+            <a:br>
+              <a:rPr lang="en-GB" dirty="0"/>
+            </a:br>
+            <a:br>
+              <a:rPr lang="en-GB" dirty="0"/>
+            </a:br>
+            <a:r>
+              <a:rPr lang="en-GB" b="1" dirty="0"/>
+              <a:t>Export</a:t>
+            </a:r>
+            <a:r>
+              <a:rPr lang="en-GB" dirty="0"/>
+              <a:t> functions or variables from one file.</a:t>
+            </a:r>
+            <a:br>
+              <a:rPr lang="en-GB" dirty="0"/>
+            </a:br>
+            <a:br>
+              <a:rPr lang="en-GB" dirty="0"/>
+            </a:br>
+            <a:br>
+              <a:rPr lang="en-GB" dirty="0"/>
+            </a:br>
+            <a:br>
+              <a:rPr lang="en-GB" dirty="0"/>
+            </a:br>
+            <a:br>
+              <a:rPr lang="en-GB" dirty="0"/>
+            </a:br>
+            <a:r>
+              <a:rPr lang="en-GB" b="1" dirty="0"/>
+              <a:t>Import</a:t>
+            </a:r>
+            <a:r>
+              <a:rPr lang="en-GB" dirty="0"/>
+              <a:t> them in another file.</a:t>
+            </a:r>
+          </a:p>
+        </p:txBody>
+      </p:sp>
+      <p:pic>
+        <p:nvPicPr>
+          <p:cNvPr id="5" name="Picture 4">
+            <a:extLst>
+              <a:ext uri="{FF2B5EF4-FFF2-40B4-BE49-F238E27FC236}">
+                <a16:creationId xmlns:a16="http://schemas.microsoft.com/office/drawing/2014/main" id="{4E132404-17D2-75B7-E5D1-A4639BE993D1}"/>
+              </a:ext>
+            </a:extLst>
+          </p:cNvPr>
+          <p:cNvPicPr>
+            <a:picLocks noChangeAspect="1"/>
+          </p:cNvPicPr>
+          <p:nvPr/>
+        </p:nvPicPr>
+        <p:blipFill>
+          <a:blip r:embed="rId2"/>
+          <a:stretch>
+            <a:fillRect/>
+          </a:stretch>
+        </p:blipFill>
+        <p:spPr>
+          <a:xfrm>
+            <a:off x="1069732" y="4044526"/>
+            <a:ext cx="6019800" cy="520700"/>
+          </a:xfrm>
+          <a:prstGeom prst="rect">
+            <a:avLst/>
+          </a:prstGeom>
+        </p:spPr>
+      </p:pic>
+      <p:pic>
+        <p:nvPicPr>
+          <p:cNvPr id="8" name="Picture 7" descr="A close-up of a computer code&#10;&#10;Description automatically generated">
+            <a:extLst>
+              <a:ext uri="{FF2B5EF4-FFF2-40B4-BE49-F238E27FC236}">
+                <a16:creationId xmlns:a16="http://schemas.microsoft.com/office/drawing/2014/main" id="{A1EF7680-C7B3-4945-2A9B-BD3F08B956FF}"/>
+              </a:ext>
+            </a:extLst>
+          </p:cNvPr>
+          <p:cNvPicPr>
+            <a:picLocks noChangeAspect="1"/>
+          </p:cNvPicPr>
+          <p:nvPr/>
+        </p:nvPicPr>
+        <p:blipFill>
+          <a:blip r:embed="rId3"/>
+          <a:stretch>
+            <a:fillRect/>
+          </a:stretch>
+        </p:blipFill>
+        <p:spPr>
+          <a:xfrm>
+            <a:off x="1069732" y="5441950"/>
+            <a:ext cx="4305300" cy="838200"/>
+          </a:xfrm>
+          <a:prstGeom prst="rect">
+            <a:avLst/>
+          </a:prstGeom>
+        </p:spPr>
+      </p:pic>
+    </p:spTree>
+    <p:extLst>
+      <p:ext uri="{BB962C8B-B14F-4D97-AF65-F5344CB8AC3E}">
+        <p14:creationId xmlns:p14="http://schemas.microsoft.com/office/powerpoint/2010/main" val="1667915891"/>
+      </p:ext>
+    </p:extLst>
+  </p:cSld>
+  <p:clrMapOvr>
+    <a:masterClrMapping/>
+  </p:clrMapOvr>
+</p:sld>
+</file>
+
+<file path=ppt/slides/slide15.xml><?xml version="1.0" encoding="utf-8"?>
+<p:sld xmlns:a="http://schemas.openxmlformats.org/drawingml/2006/main" xmlns:r="http://schemas.openxmlformats.org/officeDocument/2006/relationships" xmlns:p="http://schemas.openxmlformats.org/presentationml/2006/main">
+  <p:cSld>
+    <p:spTree>
+      <p:nvGrpSpPr>
+        <p:cNvPr id="1" name="">
+          <a:extLst>
+            <a:ext uri="{FF2B5EF4-FFF2-40B4-BE49-F238E27FC236}">
+              <a16:creationId xmlns:a16="http://schemas.microsoft.com/office/drawing/2014/main" id="{D1E134D8-E2A5-EF17-1794-AC30DDBD1683}"/>
+            </a:ext>
+          </a:extLst>
+        </p:cNvPr>
+        <p:cNvGrpSpPr/>
+        <p:nvPr/>
+      </p:nvGrpSpPr>
+      <p:grpSpPr>
+        <a:xfrm>
+          <a:off x="0" y="0"/>
+          <a:ext cx="0" cy="0"/>
+          <a:chOff x="0" y="0"/>
+          <a:chExt cx="0" cy="0"/>
+        </a:xfrm>
+      </p:grpSpPr>
+      <p:sp>
+        <p:nvSpPr>
+          <p:cNvPr id="2" name="Title 1">
+            <a:extLst>
+              <a:ext uri="{FF2B5EF4-FFF2-40B4-BE49-F238E27FC236}">
+                <a16:creationId xmlns:a16="http://schemas.microsoft.com/office/drawing/2014/main" id="{56CE0E3C-1E7B-46CC-5DDB-AB05FC83AB2C}"/>
+              </a:ext>
+            </a:extLst>
+          </p:cNvPr>
+          <p:cNvSpPr>
+            <a:spLocks noGrp="1"/>
+          </p:cNvSpPr>
+          <p:nvPr>
+            <p:ph type="title"/>
+          </p:nvPr>
+        </p:nvSpPr>
+        <p:spPr>
+          <a:xfrm>
+            <a:off x="581193" y="729658"/>
+            <a:ext cx="11029616" cy="988332"/>
+          </a:xfrm>
+        </p:spPr>
+        <p:txBody>
+          <a:bodyPr anchor="b">
+            <a:normAutofit/>
+          </a:bodyPr>
+          <a:lstStyle/>
+          <a:p>
+            <a:r>
+              <a:rPr lang="en-GB" dirty="0"/>
+              <a:t>Passing Command Line Parameters</a:t>
+            </a:r>
+          </a:p>
+        </p:txBody>
+      </p:sp>
+      <p:sp>
+        <p:nvSpPr>
+          <p:cNvPr id="3" name="Content Placeholder 2">
+            <a:extLst>
+              <a:ext uri="{FF2B5EF4-FFF2-40B4-BE49-F238E27FC236}">
+                <a16:creationId xmlns:a16="http://schemas.microsoft.com/office/drawing/2014/main" id="{BFA7AFA5-FD54-AFF4-2085-B25FCD6FC3F5}"/>
+              </a:ext>
+            </a:extLst>
+          </p:cNvPr>
+          <p:cNvSpPr>
+            <a:spLocks noGrp="1"/>
+          </p:cNvSpPr>
+          <p:nvPr>
+            <p:ph sz="half" idx="1"/>
+          </p:nvPr>
+        </p:nvSpPr>
+        <p:spPr>
+          <a:xfrm>
+            <a:off x="581193" y="2228003"/>
+            <a:ext cx="7331884" cy="3633047"/>
+          </a:xfrm>
+        </p:spPr>
+        <p:txBody>
+          <a:bodyPr anchor="ctr">
+            <a:normAutofit/>
+          </a:bodyPr>
+          <a:lstStyle/>
+          <a:p>
+            <a:r>
+              <a:rPr lang="en-GB" b="1" dirty="0"/>
+              <a:t>How to Access Command Line Arguments in Node.js</a:t>
+            </a:r>
+            <a:r>
+              <a:rPr lang="en-GB" dirty="0"/>
+              <a:t>:</a:t>
+            </a:r>
+            <a:br>
+              <a:rPr lang="en-GB" dirty="0"/>
+            </a:br>
+            <a:br>
+              <a:rPr lang="en-GB" dirty="0"/>
+            </a:br>
+            <a:r>
+              <a:rPr lang="en-GB" dirty="0"/>
+              <a:t>Use </a:t>
+            </a:r>
+            <a:r>
+              <a:rPr lang="en-GB" dirty="0" err="1"/>
+              <a:t>process.argv</a:t>
+            </a:r>
+            <a:r>
+              <a:rPr lang="en-GB" dirty="0"/>
+              <a:t>.</a:t>
+            </a:r>
+            <a:br>
+              <a:rPr lang="en-GB" dirty="0"/>
+            </a:br>
+            <a:endParaRPr lang="en-GB" dirty="0"/>
+          </a:p>
+          <a:p>
+            <a:r>
+              <a:rPr lang="en-GB" b="1" dirty="0"/>
+              <a:t>Example</a:t>
+            </a:r>
+            <a:r>
+              <a:rPr lang="en-GB" dirty="0"/>
+              <a:t>:</a:t>
+            </a:r>
+          </a:p>
+        </p:txBody>
+      </p:sp>
+      <p:pic>
+        <p:nvPicPr>
+          <p:cNvPr id="6" name="Picture 5">
+            <a:extLst>
+              <a:ext uri="{FF2B5EF4-FFF2-40B4-BE49-F238E27FC236}">
+                <a16:creationId xmlns:a16="http://schemas.microsoft.com/office/drawing/2014/main" id="{64906F3F-6728-BB57-2764-D730BB0902A5}"/>
+              </a:ext>
+            </a:extLst>
+          </p:cNvPr>
+          <p:cNvPicPr>
+            <a:picLocks noChangeAspect="1"/>
+          </p:cNvPicPr>
+          <p:nvPr/>
+        </p:nvPicPr>
+        <p:blipFill>
+          <a:blip r:embed="rId2"/>
+          <a:stretch>
+            <a:fillRect/>
+          </a:stretch>
+        </p:blipFill>
+        <p:spPr>
+          <a:xfrm>
+            <a:off x="825500" y="5192765"/>
+            <a:ext cx="7772400" cy="536027"/>
+          </a:xfrm>
+          <a:prstGeom prst="rect">
+            <a:avLst/>
+          </a:prstGeom>
+        </p:spPr>
+      </p:pic>
+    </p:spTree>
+    <p:extLst>
+      <p:ext uri="{BB962C8B-B14F-4D97-AF65-F5344CB8AC3E}">
+        <p14:creationId xmlns:p14="http://schemas.microsoft.com/office/powerpoint/2010/main" val="3419495277"/>
+      </p:ext>
+    </p:extLst>
+  </p:cSld>
+  <p:clrMapOvr>
+    <a:masterClrMapping/>
+  </p:clrMapOvr>
+</p:sld>
+</file>
+
+<file path=ppt/slides/slide16.xml><?xml version="1.0" encoding="utf-8"?>
+<p:sld xmlns:a="http://schemas.openxmlformats.org/drawingml/2006/main" xmlns:r="http://schemas.openxmlformats.org/officeDocument/2006/relationships" xmlns:p="http://schemas.openxmlformats.org/presentationml/2006/main">
+  <p:cSld>
+    <p:spTree>
+      <p:nvGrpSpPr>
+        <p:cNvPr id="1" name="">
+          <a:extLst>
+            <a:ext uri="{FF2B5EF4-FFF2-40B4-BE49-F238E27FC236}">
+              <a16:creationId xmlns:a16="http://schemas.microsoft.com/office/drawing/2014/main" id="{62D70204-99E1-5F56-923D-20BDFBB5F267}"/>
+            </a:ext>
+          </a:extLst>
+        </p:cNvPr>
+        <p:cNvGrpSpPr/>
+        <p:nvPr/>
+      </p:nvGrpSpPr>
+      <p:grpSpPr>
+        <a:xfrm>
+          <a:off x="0" y="0"/>
+          <a:ext cx="0" cy="0"/>
+          <a:chOff x="0" y="0"/>
+          <a:chExt cx="0" cy="0"/>
+        </a:xfrm>
+      </p:grpSpPr>
+      <p:sp>
+        <p:nvSpPr>
+          <p:cNvPr id="2" name="Title 1">
+            <a:extLst>
+              <a:ext uri="{FF2B5EF4-FFF2-40B4-BE49-F238E27FC236}">
+                <a16:creationId xmlns:a16="http://schemas.microsoft.com/office/drawing/2014/main" id="{FCF8A187-FC49-9BFF-BC2A-088B8CC0A48F}"/>
+              </a:ext>
+            </a:extLst>
+          </p:cNvPr>
+          <p:cNvSpPr>
+            <a:spLocks noGrp="1"/>
+          </p:cNvSpPr>
+          <p:nvPr>
+            <p:ph type="title"/>
+          </p:nvPr>
+        </p:nvSpPr>
+        <p:spPr>
+          <a:xfrm>
+            <a:off x="581193" y="729658"/>
+            <a:ext cx="11029616" cy="988332"/>
+          </a:xfrm>
+        </p:spPr>
+        <p:txBody>
+          <a:bodyPr anchor="b">
+            <a:normAutofit/>
+          </a:bodyPr>
+          <a:lstStyle/>
+          <a:p>
+            <a:r>
+              <a:rPr lang="en-GB" dirty="0"/>
+              <a:t>The Filesystem in Node.js</a:t>
+            </a:r>
+          </a:p>
+        </p:txBody>
+      </p:sp>
+      <p:sp>
+        <p:nvSpPr>
+          <p:cNvPr id="3" name="Content Placeholder 2">
+            <a:extLst>
+              <a:ext uri="{FF2B5EF4-FFF2-40B4-BE49-F238E27FC236}">
+                <a16:creationId xmlns:a16="http://schemas.microsoft.com/office/drawing/2014/main" id="{48E4D2BF-6D5C-06F9-7CA4-579E06D843B0}"/>
+              </a:ext>
+            </a:extLst>
+          </p:cNvPr>
+          <p:cNvSpPr>
+            <a:spLocks noGrp="1"/>
+          </p:cNvSpPr>
+          <p:nvPr>
+            <p:ph sz="half" idx="1"/>
+          </p:nvPr>
+        </p:nvSpPr>
+        <p:spPr>
+          <a:xfrm>
+            <a:off x="581193" y="2228003"/>
+            <a:ext cx="7331884" cy="3633047"/>
+          </a:xfrm>
+        </p:spPr>
+        <p:txBody>
+          <a:bodyPr anchor="ctr">
+            <a:normAutofit/>
+          </a:bodyPr>
+          <a:lstStyle/>
+          <a:p>
+            <a:r>
+              <a:rPr lang="en-GB" b="1" dirty="0"/>
+              <a:t>Core Functions</a:t>
+            </a:r>
+            <a:r>
+              <a:rPr lang="en-GB" dirty="0"/>
+              <a:t>:</a:t>
+            </a:r>
+          </a:p>
+          <a:p>
+            <a:pPr marL="742950" lvl="1" indent="-285750">
+              <a:buFont typeface="Arial" panose="020B0604020202020204" pitchFamily="34" charset="0"/>
+              <a:buChar char="•"/>
+            </a:pPr>
+            <a:r>
+              <a:rPr lang="en-GB" dirty="0" err="1"/>
+              <a:t>readFile</a:t>
+            </a:r>
+            <a:r>
+              <a:rPr lang="en-GB" dirty="0"/>
+              <a:t>: Reads the contents of a file.</a:t>
+            </a:r>
+          </a:p>
+          <a:p>
+            <a:pPr marL="742950" lvl="1" indent="-285750">
+              <a:buFont typeface="Arial" panose="020B0604020202020204" pitchFamily="34" charset="0"/>
+              <a:buChar char="•"/>
+            </a:pPr>
+            <a:r>
+              <a:rPr lang="en-GB" dirty="0" err="1"/>
+              <a:t>writeFile</a:t>
+            </a:r>
+            <a:r>
+              <a:rPr lang="en-GB" dirty="0"/>
+              <a:t>: Writes data to a file, overwriting existing content.</a:t>
+            </a:r>
+          </a:p>
+          <a:p>
+            <a:pPr marL="742950" lvl="1" indent="-285750">
+              <a:buFont typeface="Arial" panose="020B0604020202020204" pitchFamily="34" charset="0"/>
+              <a:buChar char="•"/>
+            </a:pPr>
+            <a:r>
+              <a:rPr lang="en-GB" dirty="0" err="1"/>
+              <a:t>appendFile</a:t>
+            </a:r>
+            <a:r>
+              <a:rPr lang="en-GB" dirty="0"/>
+              <a:t>: Adds data to an existing file without overwriting.</a:t>
+            </a:r>
+          </a:p>
+        </p:txBody>
+      </p:sp>
+    </p:spTree>
+    <p:extLst>
+      <p:ext uri="{BB962C8B-B14F-4D97-AF65-F5344CB8AC3E}">
+        <p14:creationId xmlns:p14="http://schemas.microsoft.com/office/powerpoint/2010/main" val="960265058"/>
+      </p:ext>
+    </p:extLst>
+  </p:cSld>
+  <p:clrMapOvr>
+    <a:masterClrMapping/>
+  </p:clrMapOvr>
+</p:sld>
+</file>
+
+<file path=ppt/slides/slide17.xml><?xml version="1.0" encoding="utf-8"?>
+<p:sld xmlns:a="http://schemas.openxmlformats.org/drawingml/2006/main" xmlns:r="http://schemas.openxmlformats.org/officeDocument/2006/relationships" xmlns:p="http://schemas.openxmlformats.org/presentationml/2006/main">
+  <p:cSld>
+    <p:spTree>
+      <p:nvGrpSpPr>
+        <p:cNvPr id="1" name="">
+          <a:extLst>
+            <a:ext uri="{FF2B5EF4-FFF2-40B4-BE49-F238E27FC236}">
+              <a16:creationId xmlns:a16="http://schemas.microsoft.com/office/drawing/2014/main" id="{B1CA8717-8F48-FD05-355A-74FA6025B570}"/>
+            </a:ext>
+          </a:extLst>
+        </p:cNvPr>
+        <p:cNvGrpSpPr/>
+        <p:nvPr/>
+      </p:nvGrpSpPr>
+      <p:grpSpPr>
+        <a:xfrm>
+          <a:off x="0" y="0"/>
+          <a:ext cx="0" cy="0"/>
+          <a:chOff x="0" y="0"/>
+          <a:chExt cx="0" cy="0"/>
+        </a:xfrm>
+      </p:grpSpPr>
+      <p:sp>
+        <p:nvSpPr>
+          <p:cNvPr id="2" name="Title 1">
+            <a:extLst>
+              <a:ext uri="{FF2B5EF4-FFF2-40B4-BE49-F238E27FC236}">
+                <a16:creationId xmlns:a16="http://schemas.microsoft.com/office/drawing/2014/main" id="{FFB0447E-957D-E07C-9B94-571BC63AD3A5}"/>
+              </a:ext>
+            </a:extLst>
+          </p:cNvPr>
+          <p:cNvSpPr>
+            <a:spLocks noGrp="1"/>
+          </p:cNvSpPr>
+          <p:nvPr>
+            <p:ph type="title"/>
+          </p:nvPr>
+        </p:nvSpPr>
+        <p:spPr>
+          <a:xfrm>
+            <a:off x="581193" y="729658"/>
+            <a:ext cx="11029616" cy="988332"/>
+          </a:xfrm>
+        </p:spPr>
+        <p:txBody>
+          <a:bodyPr anchor="b">
+            <a:normAutofit/>
+          </a:bodyPr>
+          <a:lstStyle/>
+          <a:p>
+            <a:r>
+              <a:rPr lang="en-GB" dirty="0"/>
+              <a:t>Reading and Writing Files</a:t>
+            </a:r>
+          </a:p>
+        </p:txBody>
+      </p:sp>
+      <p:sp>
+        <p:nvSpPr>
+          <p:cNvPr id="3" name="Content Placeholder 2">
+            <a:extLst>
+              <a:ext uri="{FF2B5EF4-FFF2-40B4-BE49-F238E27FC236}">
+                <a16:creationId xmlns:a16="http://schemas.microsoft.com/office/drawing/2014/main" id="{4417F00C-E58A-C0D8-29FC-E9C0DCE15096}"/>
+              </a:ext>
+            </a:extLst>
+          </p:cNvPr>
+          <p:cNvSpPr>
+            <a:spLocks noGrp="1"/>
+          </p:cNvSpPr>
+          <p:nvPr>
+            <p:ph sz="half" idx="1"/>
+          </p:nvPr>
+        </p:nvSpPr>
+        <p:spPr>
+          <a:xfrm>
+            <a:off x="581193" y="2228003"/>
+            <a:ext cx="7331884" cy="3633047"/>
+          </a:xfrm>
+        </p:spPr>
+        <p:txBody>
+          <a:bodyPr anchor="ctr">
+            <a:normAutofit/>
+          </a:bodyPr>
+          <a:lstStyle/>
+          <a:p>
+            <a:r>
+              <a:rPr lang="en-GB" b="1" dirty="0"/>
+              <a:t>Reading a File Example</a:t>
+            </a:r>
+            <a:r>
+              <a:rPr lang="en-GB" dirty="0"/>
+              <a:t>:</a:t>
+            </a:r>
+          </a:p>
+          <a:p>
+            <a:endParaRPr lang="en-GB" dirty="0"/>
+          </a:p>
+          <a:p>
+            <a:endParaRPr lang="en-GB" dirty="0"/>
+          </a:p>
+          <a:p>
+            <a:endParaRPr lang="en-GB" dirty="0"/>
+          </a:p>
+          <a:p>
+            <a:endParaRPr lang="en-GB" dirty="0"/>
+          </a:p>
+          <a:p>
+            <a:r>
+              <a:rPr lang="en-GB" b="1" dirty="0"/>
+              <a:t>Writing to a File Example</a:t>
+            </a:r>
+            <a:r>
+              <a:rPr lang="en-GB" dirty="0"/>
+              <a:t>:</a:t>
+            </a:r>
+          </a:p>
+        </p:txBody>
+      </p:sp>
+      <p:pic>
+        <p:nvPicPr>
+          <p:cNvPr id="5" name="Picture 4">
+            <a:extLst>
+              <a:ext uri="{FF2B5EF4-FFF2-40B4-BE49-F238E27FC236}">
+                <a16:creationId xmlns:a16="http://schemas.microsoft.com/office/drawing/2014/main" id="{FEAF933B-9A0D-B8FF-7B7F-9613288ADFEC}"/>
+              </a:ext>
+            </a:extLst>
+          </p:cNvPr>
+          <p:cNvPicPr>
+            <a:picLocks noChangeAspect="1"/>
+          </p:cNvPicPr>
+          <p:nvPr/>
+        </p:nvPicPr>
+        <p:blipFill>
+          <a:blip r:embed="rId2"/>
+          <a:stretch>
+            <a:fillRect/>
+          </a:stretch>
+        </p:blipFill>
+        <p:spPr>
+          <a:xfrm>
+            <a:off x="5036527" y="2228003"/>
+            <a:ext cx="5753100" cy="1727200"/>
+          </a:xfrm>
+          <a:prstGeom prst="rect">
+            <a:avLst/>
+          </a:prstGeom>
+        </p:spPr>
+      </p:pic>
+      <p:pic>
+        <p:nvPicPr>
+          <p:cNvPr id="7" name="Picture 6" descr="A computer screen with green text&#10;&#10;Description automatically generated">
+            <a:extLst>
+              <a:ext uri="{FF2B5EF4-FFF2-40B4-BE49-F238E27FC236}">
+                <a16:creationId xmlns:a16="http://schemas.microsoft.com/office/drawing/2014/main" id="{88994E89-8B50-7494-EBB2-E69511192195}"/>
+              </a:ext>
+            </a:extLst>
+          </p:cNvPr>
+          <p:cNvPicPr>
+            <a:picLocks noChangeAspect="1"/>
+          </p:cNvPicPr>
+          <p:nvPr/>
+        </p:nvPicPr>
+        <p:blipFill>
+          <a:blip r:embed="rId3"/>
+          <a:stretch>
+            <a:fillRect/>
+          </a:stretch>
+        </p:blipFill>
+        <p:spPr>
+          <a:xfrm>
+            <a:off x="5036527" y="4422461"/>
+            <a:ext cx="6261100" cy="1435100"/>
+          </a:xfrm>
+          <a:prstGeom prst="rect">
+            <a:avLst/>
+          </a:prstGeom>
+        </p:spPr>
+      </p:pic>
+    </p:spTree>
+    <p:extLst>
+      <p:ext uri="{BB962C8B-B14F-4D97-AF65-F5344CB8AC3E}">
+        <p14:creationId xmlns:p14="http://schemas.microsoft.com/office/powerpoint/2010/main" val="3020713118"/>
+      </p:ext>
+    </p:extLst>
+  </p:cSld>
+  <p:clrMapOvr>
+    <a:masterClrMapping/>
+  </p:clrMapOvr>
+</p:sld>
+</file>
+
+<file path=ppt/slides/slide18.xml><?xml version="1.0" encoding="utf-8"?>
+<p:sld xmlns:a="http://schemas.openxmlformats.org/drawingml/2006/main" xmlns:r="http://schemas.openxmlformats.org/officeDocument/2006/relationships" xmlns:p="http://schemas.openxmlformats.org/presentationml/2006/main">
+  <p:cSld>
+    <p:spTree>
+      <p:nvGrpSpPr>
+        <p:cNvPr id="1" name="">
+          <a:extLst>
+            <a:ext uri="{FF2B5EF4-FFF2-40B4-BE49-F238E27FC236}">
+              <a16:creationId xmlns:a16="http://schemas.microsoft.com/office/drawing/2014/main" id="{02EBCE78-5152-36B6-288D-C163757EABBC}"/>
+            </a:ext>
+          </a:extLst>
+        </p:cNvPr>
+        <p:cNvGrpSpPr/>
+        <p:nvPr/>
+      </p:nvGrpSpPr>
+      <p:grpSpPr>
+        <a:xfrm>
+          <a:off x="0" y="0"/>
+          <a:ext cx="0" cy="0"/>
+          <a:chOff x="0" y="0"/>
+          <a:chExt cx="0" cy="0"/>
+        </a:xfrm>
+      </p:grpSpPr>
+      <p:sp>
+        <p:nvSpPr>
+          <p:cNvPr id="2" name="Title 1">
+            <a:extLst>
+              <a:ext uri="{FF2B5EF4-FFF2-40B4-BE49-F238E27FC236}">
+                <a16:creationId xmlns:a16="http://schemas.microsoft.com/office/drawing/2014/main" id="{ACA63CBB-ADE2-80E4-0471-794D3F54D51B}"/>
+              </a:ext>
+            </a:extLst>
+          </p:cNvPr>
+          <p:cNvSpPr>
+            <a:spLocks noGrp="1"/>
+          </p:cNvSpPr>
+          <p:nvPr>
+            <p:ph type="title"/>
+          </p:nvPr>
+        </p:nvSpPr>
+        <p:spPr>
+          <a:xfrm>
+            <a:off x="581193" y="729658"/>
+            <a:ext cx="11029616" cy="988332"/>
+          </a:xfrm>
+        </p:spPr>
+        <p:txBody>
+          <a:bodyPr anchor="b">
+            <a:normAutofit/>
+          </a:bodyPr>
+          <a:lstStyle/>
+          <a:p>
+            <a:r>
+              <a:rPr lang="en-GB" dirty="0"/>
+              <a:t>Using </a:t>
+            </a:r>
+            <a:r>
+              <a:rPr lang="en-GB" dirty="0" err="1"/>
+              <a:t>appendFile</a:t>
+            </a:r>
+            <a:endParaRPr lang="en-GB" dirty="0"/>
+          </a:p>
+        </p:txBody>
+      </p:sp>
+      <p:sp>
+        <p:nvSpPr>
+          <p:cNvPr id="3" name="Content Placeholder 2">
+            <a:extLst>
+              <a:ext uri="{FF2B5EF4-FFF2-40B4-BE49-F238E27FC236}">
+                <a16:creationId xmlns:a16="http://schemas.microsoft.com/office/drawing/2014/main" id="{521BDE3E-4A94-14A3-915B-5F98D26C0E01}"/>
+              </a:ext>
+            </a:extLst>
+          </p:cNvPr>
+          <p:cNvSpPr>
+            <a:spLocks noGrp="1"/>
+          </p:cNvSpPr>
+          <p:nvPr>
+            <p:ph sz="half" idx="1"/>
+          </p:nvPr>
+        </p:nvSpPr>
+        <p:spPr>
+          <a:xfrm>
+            <a:off x="581193" y="2228003"/>
+            <a:ext cx="7331884" cy="3633047"/>
+          </a:xfrm>
+        </p:spPr>
+        <p:txBody>
+          <a:bodyPr anchor="ctr">
+            <a:normAutofit/>
+          </a:bodyPr>
+          <a:lstStyle/>
+          <a:p>
+            <a:r>
+              <a:rPr lang="en-GB" b="1" dirty="0"/>
+              <a:t>Appending Data to a File</a:t>
+            </a:r>
+            <a:r>
+              <a:rPr lang="en-GB" dirty="0"/>
+              <a:t>:</a:t>
+            </a:r>
+          </a:p>
+          <a:p>
+            <a:endParaRPr lang="en-GB" dirty="0"/>
+          </a:p>
+          <a:p>
+            <a:endParaRPr lang="en-GB" dirty="0"/>
+          </a:p>
+          <a:p>
+            <a:endParaRPr lang="en-GB" dirty="0"/>
+          </a:p>
+          <a:p>
+            <a:endParaRPr lang="en-GB" dirty="0"/>
+          </a:p>
+          <a:p>
+            <a:endParaRPr lang="en-GB" dirty="0"/>
+          </a:p>
+        </p:txBody>
+      </p:sp>
+      <p:pic>
+        <p:nvPicPr>
+          <p:cNvPr id="6" name="Picture 5" descr="A black background with green text&#10;&#10;Description automatically generated">
+            <a:extLst>
+              <a:ext uri="{FF2B5EF4-FFF2-40B4-BE49-F238E27FC236}">
+                <a16:creationId xmlns:a16="http://schemas.microsoft.com/office/drawing/2014/main" id="{627C71FD-CC84-5503-8C5C-C7E1A0F94D96}"/>
+              </a:ext>
+            </a:extLst>
+          </p:cNvPr>
+          <p:cNvPicPr>
+            <a:picLocks noChangeAspect="1"/>
+          </p:cNvPicPr>
+          <p:nvPr/>
+        </p:nvPicPr>
+        <p:blipFill>
+          <a:blip r:embed="rId2"/>
+          <a:stretch>
+            <a:fillRect/>
+          </a:stretch>
+        </p:blipFill>
+        <p:spPr>
+          <a:xfrm>
+            <a:off x="723900" y="4044526"/>
+            <a:ext cx="6477000" cy="1498600"/>
+          </a:xfrm>
+          <a:prstGeom prst="rect">
+            <a:avLst/>
+          </a:prstGeom>
+        </p:spPr>
+      </p:pic>
+    </p:spTree>
+    <p:extLst>
+      <p:ext uri="{BB962C8B-B14F-4D97-AF65-F5344CB8AC3E}">
+        <p14:creationId xmlns:p14="http://schemas.microsoft.com/office/powerpoint/2010/main" val="3936462565"/>
+      </p:ext>
+    </p:extLst>
+  </p:cSld>
+  <p:clrMapOvr>
+    <a:masterClrMapping/>
+  </p:clrMapOvr>
+</p:sld>
+</file>
+
+<file path=ppt/slides/slide19.xml><?xml version="1.0" encoding="utf-8"?>
+<p:sld xmlns:a="http://schemas.openxmlformats.org/drawingml/2006/main" xmlns:r="http://schemas.openxmlformats.org/officeDocument/2006/relationships" xmlns:p="http://schemas.openxmlformats.org/presentationml/2006/main">
+  <p:cSld>
+    <p:spTree>
+      <p:nvGrpSpPr>
+        <p:cNvPr id="1" name="">
+          <a:extLst>
+            <a:ext uri="{FF2B5EF4-FFF2-40B4-BE49-F238E27FC236}">
               <a16:creationId xmlns:a16="http://schemas.microsoft.com/office/drawing/2014/main" id="{CBAE109F-588F-7134-8695-E74285284B6E}"/>
             </a:ext>
           </a:extLst>
@@ -5884,25 +7115,49 @@
           <a:p>
             <a:r>
               <a:rPr lang="en-GB" dirty="0"/>
-              <a:t>HTTP is essential for web communication.</a:t>
-            </a:r>
-          </a:p>
-          <a:p>
-            <a:r>
-              <a:rPr lang="en-GB" dirty="0"/>
-              <a:t>You can make HTTP requests using Postman or JavaScript (Fetch).</a:t>
-            </a:r>
-          </a:p>
-          <a:p>
-            <a:r>
-              <a:rPr lang="en-GB" dirty="0"/>
-              <a:t>JSON is the common data format for APIs.</a:t>
-            </a:r>
-          </a:p>
-          <a:p>
-            <a:r>
-              <a:rPr lang="en-GB" dirty="0"/>
-              <a:t>Learn how to update your web page dynamically using data from APIs.</a:t>
+              <a:t>Installed and ran Node.js.</a:t>
+            </a:r>
+          </a:p>
+          <a:p>
+            <a:r>
+              <a:rPr lang="en-GB" dirty="0"/>
+              <a:t>Debugged simple JavaScript scripts.</a:t>
+            </a:r>
+          </a:p>
+          <a:p>
+            <a:r>
+              <a:rPr lang="en-GB" dirty="0"/>
+              <a:t>Explored key features of modern JavaScript (ES6/ES7).</a:t>
+            </a:r>
+          </a:p>
+          <a:p>
+            <a:r>
+              <a:rPr lang="en-GB" dirty="0"/>
+              <a:t>Worked with the filesystem using </a:t>
+            </a:r>
+            <a:r>
+              <a:rPr lang="en-GB" dirty="0" err="1"/>
+              <a:t>readFile</a:t>
+            </a:r>
+            <a:r>
+              <a:rPr lang="en-GB" dirty="0"/>
+              <a:t>, </a:t>
+            </a:r>
+            <a:r>
+              <a:rPr lang="en-GB" dirty="0" err="1"/>
+              <a:t>writeFile</a:t>
+            </a:r>
+            <a:r>
+              <a:rPr lang="en-GB" dirty="0"/>
+              <a:t>, and </a:t>
+            </a:r>
+            <a:r>
+              <a:rPr lang="en-GB" dirty="0" err="1"/>
+              <a:t>appendFile</a:t>
+            </a:r>
+            <a:r>
+              <a:rPr lang="en-GB" dirty="0"/>
+              <a:t>.</a:t>
             </a:r>
           </a:p>
         </p:txBody>
@@ -5911,76 +7166,6 @@
     <p:extLst>
       <p:ext uri="{BB962C8B-B14F-4D97-AF65-F5344CB8AC3E}">
         <p14:creationId xmlns:p14="http://schemas.microsoft.com/office/powerpoint/2010/main" val="4093454545"/>
-      </p:ext>
-    </p:extLst>
-  </p:cSld>
-  <p:clrMapOvr>
-    <a:masterClrMapping/>
-  </p:clrMapOvr>
-</p:sld>
-</file>
-
-<file path=ppt/slides/slide13.xml><?xml version="1.0" encoding="utf-8"?>
-<p:sld xmlns:a="http://schemas.openxmlformats.org/drawingml/2006/main" xmlns:r="http://schemas.openxmlformats.org/officeDocument/2006/relationships" xmlns:p="http://schemas.openxmlformats.org/presentationml/2006/main">
-  <p:cSld>
-    <p:spTree>
-      <p:nvGrpSpPr>
-        <p:cNvPr id="1" name=""/>
-        <p:cNvGrpSpPr/>
-        <p:nvPr/>
-      </p:nvGrpSpPr>
-      <p:grpSpPr>
-        <a:xfrm>
-          <a:off x="0" y="0"/>
-          <a:ext cx="0" cy="0"/>
-          <a:chOff x="0" y="0"/>
-          <a:chExt cx="0" cy="0"/>
-        </a:xfrm>
-      </p:grpSpPr>
-      <p:sp>
-        <p:nvSpPr>
-          <p:cNvPr id="2" name="Title 1">
-            <a:extLst>
-              <a:ext uri="{FF2B5EF4-FFF2-40B4-BE49-F238E27FC236}">
-                <a16:creationId xmlns:a16="http://schemas.microsoft.com/office/drawing/2014/main" id="{2BF4E187-63BA-683D-B61F-11A4E6D447F4}"/>
-              </a:ext>
-            </a:extLst>
-          </p:cNvPr>
-          <p:cNvSpPr>
-            <a:spLocks noGrp="1"/>
-          </p:cNvSpPr>
-          <p:nvPr>
-            <p:ph type="title"/>
-          </p:nvPr>
-        </p:nvSpPr>
-        <p:spPr>
-          <a:xfrm>
-            <a:off x="581192" y="3077494"/>
-            <a:ext cx="11029616" cy="1013800"/>
-          </a:xfrm>
-        </p:spPr>
-        <p:txBody>
-          <a:bodyPr>
-            <a:normAutofit/>
-          </a:bodyPr>
-          <a:lstStyle/>
-          <a:p>
-            <a:pPr algn="ctr"/>
-            <a:r>
-              <a:rPr lang="en-GB" sz="4000" dirty="0">
-                <a:solidFill>
-                  <a:schemeClr val="accent1"/>
-                </a:solidFill>
-              </a:rPr>
-              <a:t>Questions?</a:t>
-            </a:r>
-          </a:p>
-        </p:txBody>
-      </p:sp>
-    </p:spTree>
-    <p:extLst>
-      <p:ext uri="{BB962C8B-B14F-4D97-AF65-F5344CB8AC3E}">
-        <p14:creationId xmlns:p14="http://schemas.microsoft.com/office/powerpoint/2010/main" val="1881208565"/>
       </p:ext>
     </p:extLst>
   </p:cSld>
@@ -6037,7 +7222,7 @@
           <a:p>
             <a:r>
               <a:rPr lang="en-GB" dirty="0"/>
-              <a:t>HTTP and 3rd Party APIs</a:t>
+              <a:t>Introduction to NodeJS and Debugging</a:t>
             </a:r>
           </a:p>
         </p:txBody>
@@ -6092,7 +7277,7 @@
             </a:pPr>
             <a:r>
               <a:rPr lang="en-GB" dirty="0"/>
-              <a:t>The basics of HTTP</a:t>
+              <a:t>The NodeJS environment</a:t>
             </a:r>
           </a:p>
           <a:p>
@@ -6102,7 +7287,7 @@
             </a:pPr>
             <a:r>
               <a:rPr lang="en-GB" dirty="0"/>
-              <a:t>How to make HTTP requests</a:t>
+              <a:t>Debugging techniques</a:t>
             </a:r>
           </a:p>
           <a:p>
@@ -6112,7 +7297,7 @@
             </a:pPr>
             <a:r>
               <a:rPr lang="en-GB" dirty="0"/>
-              <a:t>Using APIs with tools like Postman</a:t>
+              <a:t>Modern ES6/7 techniques</a:t>
             </a:r>
           </a:p>
           <a:p>
@@ -6122,7 +7307,7 @@
             </a:pPr>
             <a:r>
               <a:rPr lang="en-GB" dirty="0"/>
-              <a:t>Fetching and using JSON data in JavaScript</a:t>
+              <a:t>Using the file system</a:t>
             </a:r>
           </a:p>
         </p:txBody>
@@ -6131,6 +7316,76 @@
     <p:extLst>
       <p:ext uri="{BB962C8B-B14F-4D97-AF65-F5344CB8AC3E}">
         <p14:creationId xmlns:p14="http://schemas.microsoft.com/office/powerpoint/2010/main" val="2112965492"/>
+      </p:ext>
+    </p:extLst>
+  </p:cSld>
+  <p:clrMapOvr>
+    <a:masterClrMapping/>
+  </p:clrMapOvr>
+</p:sld>
+</file>
+
+<file path=ppt/slides/slide20.xml><?xml version="1.0" encoding="utf-8"?>
+<p:sld xmlns:a="http://schemas.openxmlformats.org/drawingml/2006/main" xmlns:r="http://schemas.openxmlformats.org/officeDocument/2006/relationships" xmlns:p="http://schemas.openxmlformats.org/presentationml/2006/main">
+  <p:cSld>
+    <p:spTree>
+      <p:nvGrpSpPr>
+        <p:cNvPr id="1" name=""/>
+        <p:cNvGrpSpPr/>
+        <p:nvPr/>
+      </p:nvGrpSpPr>
+      <p:grpSpPr>
+        <a:xfrm>
+          <a:off x="0" y="0"/>
+          <a:ext cx="0" cy="0"/>
+          <a:chOff x="0" y="0"/>
+          <a:chExt cx="0" cy="0"/>
+        </a:xfrm>
+      </p:grpSpPr>
+      <p:sp>
+        <p:nvSpPr>
+          <p:cNvPr id="2" name="Title 1">
+            <a:extLst>
+              <a:ext uri="{FF2B5EF4-FFF2-40B4-BE49-F238E27FC236}">
+                <a16:creationId xmlns:a16="http://schemas.microsoft.com/office/drawing/2014/main" id="{2BF4E187-63BA-683D-B61F-11A4E6D447F4}"/>
+              </a:ext>
+            </a:extLst>
+          </p:cNvPr>
+          <p:cNvSpPr>
+            <a:spLocks noGrp="1"/>
+          </p:cNvSpPr>
+          <p:nvPr>
+            <p:ph type="title"/>
+          </p:nvPr>
+        </p:nvSpPr>
+        <p:spPr>
+          <a:xfrm>
+            <a:off x="581192" y="3077494"/>
+            <a:ext cx="11029616" cy="1013800"/>
+          </a:xfrm>
+        </p:spPr>
+        <p:txBody>
+          <a:bodyPr>
+            <a:normAutofit/>
+          </a:bodyPr>
+          <a:lstStyle/>
+          <a:p>
+            <a:pPr algn="ctr"/>
+            <a:r>
+              <a:rPr lang="en-GB" sz="4000" dirty="0">
+                <a:solidFill>
+                  <a:schemeClr val="accent1"/>
+                </a:solidFill>
+              </a:rPr>
+              <a:t>Questions?</a:t>
+            </a:r>
+          </a:p>
+        </p:txBody>
+      </p:sp>
+    </p:spTree>
+    <p:extLst>
+      <p:ext uri="{BB962C8B-B14F-4D97-AF65-F5344CB8AC3E}">
+        <p14:creationId xmlns:p14="http://schemas.microsoft.com/office/powerpoint/2010/main" val="1881208565"/>
       </p:ext>
     </p:extLst>
   </p:cSld>
@@ -6187,7 +7442,7 @@
           <a:p>
             <a:r>
               <a:rPr lang="en-GB" dirty="0"/>
-              <a:t>The Fundamentals of HTTP</a:t>
+              <a:t>What is NodeJS?</a:t>
             </a:r>
           </a:p>
         </p:txBody>
@@ -6221,74 +7476,44 @@
           <a:lstStyle/>
           <a:p>
             <a:pPr>
-              <a:buFont typeface="Arial" panose="020B0604020202020204" pitchFamily="34" charset="0"/>
-              <a:buChar char="•"/>
+              <a:buFont typeface="Wingdings" pitchFamily="2" charset="2"/>
+              <a:buChar char="§"/>
             </a:pPr>
             <a:r>
               <a:rPr lang="en-GB" b="1" dirty="0"/>
-              <a:t>What is HTTP</a:t>
-            </a:r>
-            <a:r>
-              <a:rPr lang="en-GB" dirty="0"/>
-              <a:t>:</a:t>
-            </a:r>
-          </a:p>
-          <a:p>
-            <a:pPr marL="742950" lvl="1" indent="-285750">
-              <a:buFont typeface="Arial" panose="020B0604020202020204" pitchFamily="34" charset="0"/>
-              <a:buChar char="•"/>
+              <a:t>Definition</a:t>
+            </a:r>
+            <a:r>
+              <a:rPr lang="en-GB" dirty="0"/>
+              <a:t>: Node.js is a JavaScript runtime built on Chrome's V8 engine.</a:t>
+            </a:r>
+          </a:p>
+          <a:p>
+            <a:pPr>
+              <a:buFont typeface="Wingdings" pitchFamily="2" charset="2"/>
+              <a:buChar char="§"/>
             </a:pPr>
             <a:r>
-              <a:rPr lang="en-GB" dirty="0" err="1"/>
-              <a:t>HyperText</a:t>
-            </a:r>
-            <a:r>
-              <a:rPr lang="en-GB" dirty="0"/>
-              <a:t> Transfer Protocol (HTTP) is the foundation of communication on the web.</a:t>
-            </a:r>
-          </a:p>
-          <a:p>
-            <a:pPr marL="742950" lvl="1" indent="-285750">
-              <a:buFont typeface="Arial" panose="020B0604020202020204" pitchFamily="34" charset="0"/>
-              <a:buChar char="•"/>
+              <a:rPr lang="en-GB" b="1" dirty="0"/>
+              <a:t>Purpose</a:t>
+            </a:r>
+            <a:r>
+              <a:rPr lang="en-GB" dirty="0"/>
+              <a:t>: Allows JavaScript to run server-side, outside the browser.</a:t>
+            </a:r>
+          </a:p>
+          <a:p>
+            <a:pPr>
+              <a:buFont typeface="Wingdings" pitchFamily="2" charset="2"/>
+              <a:buChar char="§"/>
             </a:pPr>
             <a:r>
-              <a:rPr lang="en-GB" dirty="0"/>
-              <a:t>It enables browsers and servers to exchange data.</a:t>
-            </a:r>
-          </a:p>
-          <a:p>
-            <a:pPr>
-              <a:buFont typeface="Arial" panose="020B0604020202020204" pitchFamily="34" charset="0"/>
-              <a:buChar char="•"/>
-            </a:pPr>
-            <a:r>
               <a:rPr lang="en-GB" b="1" dirty="0"/>
-              <a:t>Key Concepts</a:t>
-            </a:r>
-            <a:r>
-              <a:rPr lang="en-GB" dirty="0"/>
-              <a:t>:</a:t>
-            </a:r>
-          </a:p>
-          <a:p>
-            <a:pPr marL="742950" lvl="1" indent="-285750">
-              <a:buFont typeface="Arial" panose="020B0604020202020204" pitchFamily="34" charset="0"/>
-              <a:buChar char="•"/>
-            </a:pPr>
-            <a:r>
-              <a:rPr lang="en-GB" dirty="0"/>
-              <a:t>Clients (your browser, Postman) request resources.</a:t>
-            </a:r>
-          </a:p>
-          <a:p>
-            <a:pPr marL="742950" lvl="1" indent="-285750">
-              <a:buFont typeface="Arial" panose="020B0604020202020204" pitchFamily="34" charset="0"/>
-              <a:buChar char="•"/>
-            </a:pPr>
-            <a:r>
-              <a:rPr lang="en-GB" dirty="0"/>
-              <a:t>Servers respond to those requests.</a:t>
+              <a:t>Key Features</a:t>
+            </a:r>
+            <a:r>
+              <a:rPr lang="en-GB" dirty="0"/>
+              <a:t>: Non-blocking I/O, event-driven, fast and lightweight.</a:t>
             </a:r>
           </a:p>
         </p:txBody>
@@ -6359,7 +7584,7 @@
           <a:p>
             <a:r>
               <a:rPr lang="en-GB" dirty="0"/>
-              <a:t>How HTTP Requests Work</a:t>
+              <a:t>Installing NodeJS</a:t>
             </a:r>
           </a:p>
         </p:txBody>
@@ -6388,17 +7613,13 @@
         </p:spPr>
         <p:txBody>
           <a:bodyPr anchor="ctr">
-            <a:normAutofit fontScale="85000" lnSpcReduction="20000"/>
+            <a:normAutofit/>
           </a:bodyPr>
           <a:lstStyle/>
           <a:p>
-            <a:pPr>
-              <a:buFont typeface="Arial" panose="020B0604020202020204" pitchFamily="34" charset="0"/>
-              <a:buChar char="•"/>
-            </a:pPr>
             <a:r>
               <a:rPr lang="en-GB" b="1" dirty="0"/>
-              <a:t>The Request-Response Cycle</a:t>
+              <a:t>Step-by-Step Installation</a:t>
             </a:r>
             <a:r>
               <a:rPr lang="en-GB" dirty="0"/>
@@ -6411,358 +7632,11 @@
               <a:rPr lang="en-GB" dirty="0"/>
             </a:br>
             <a:r>
-              <a:rPr lang="en-GB" b="1" dirty="0"/>
-              <a:t>Request</a:t>
-            </a:r>
-            <a:r>
-              <a:rPr lang="en-GB" dirty="0"/>
-              <a:t>: Made by the client (browser or API tool) to request data.</a:t>
-            </a:r>
-            <a:br>
-              <a:rPr lang="en-GB" dirty="0"/>
-            </a:br>
-            <a:br>
-              <a:rPr lang="en-GB" dirty="0"/>
-            </a:br>
-            <a:r>
-              <a:rPr lang="en-GB" b="1" dirty="0"/>
-              <a:t>Response</a:t>
-            </a:r>
-            <a:r>
-              <a:rPr lang="en-GB" dirty="0"/>
-              <a:t>: Sent by the server, often in HTML, JSON, or another format.</a:t>
-            </a:r>
-          </a:p>
-          <a:p>
-            <a:pPr>
-              <a:buFont typeface="Arial" panose="020B0604020202020204" pitchFamily="34" charset="0"/>
-              <a:buChar char="•"/>
-            </a:pPr>
-            <a:r>
-              <a:rPr lang="en-GB" b="1" dirty="0"/>
-              <a:t>Components of an HTTP Request</a:t>
-            </a:r>
-            <a:r>
-              <a:rPr lang="en-GB" dirty="0"/>
-              <a:t>:</a:t>
-            </a:r>
-            <a:br>
-              <a:rPr lang="en-GB" dirty="0"/>
-            </a:br>
-            <a:br>
-              <a:rPr lang="en-GB" dirty="0"/>
-            </a:br>
-            <a:r>
-              <a:rPr lang="en-GB" b="1" dirty="0"/>
-              <a:t>URL</a:t>
-            </a:r>
-            <a:r>
-              <a:rPr lang="en-GB" dirty="0"/>
-              <a:t>: The address of the resource.</a:t>
-            </a:r>
-            <a:br>
-              <a:rPr lang="en-GB" dirty="0"/>
-            </a:br>
-            <a:br>
-              <a:rPr lang="en-GB" dirty="0"/>
-            </a:br>
-            <a:r>
-              <a:rPr lang="en-GB" b="1" dirty="0"/>
-              <a:t>Method</a:t>
-            </a:r>
-            <a:r>
-              <a:rPr lang="en-GB" dirty="0"/>
-              <a:t>: GET, POST, etc.</a:t>
-            </a:r>
-            <a:br>
-              <a:rPr lang="en-GB" dirty="0"/>
-            </a:br>
-            <a:br>
-              <a:rPr lang="en-GB" dirty="0"/>
-            </a:br>
-            <a:r>
-              <a:rPr lang="en-GB" b="1" dirty="0"/>
-              <a:t>Headers</a:t>
-            </a:r>
-            <a:r>
-              <a:rPr lang="en-GB" dirty="0"/>
-              <a:t>: Additional information, like content type.</a:t>
-            </a:r>
-            <a:br>
-              <a:rPr lang="en-GB" dirty="0"/>
-            </a:br>
-            <a:br>
-              <a:rPr lang="en-GB" dirty="0"/>
-            </a:br>
-            <a:r>
-              <a:rPr lang="en-GB" b="1" dirty="0"/>
-              <a:t>Body</a:t>
-            </a:r>
-            <a:r>
-              <a:rPr lang="en-GB" dirty="0"/>
-              <a:t>: (Optional) Data sent with requests (mainly POST).</a:t>
-            </a:r>
-            <a:br>
-              <a:rPr lang="en-GB" dirty="0"/>
-            </a:br>
-            <a:br>
-              <a:rPr lang="en-GB" dirty="0"/>
-            </a:br>
-            <a:endParaRPr lang="en-GB" dirty="0"/>
-          </a:p>
-        </p:txBody>
-      </p:sp>
-      <p:sp>
-        <p:nvSpPr>
-          <p:cNvPr id="4" name="Content Placeholder 2">
-            <a:extLst>
-              <a:ext uri="{FF2B5EF4-FFF2-40B4-BE49-F238E27FC236}">
-                <a16:creationId xmlns:a16="http://schemas.microsoft.com/office/drawing/2014/main" id="{B9566883-B6C2-1BB9-ED2D-22C67D069BD3}"/>
-              </a:ext>
-            </a:extLst>
-          </p:cNvPr>
-          <p:cNvSpPr txBox="1">
-            <a:spLocks/>
-          </p:cNvSpPr>
-          <p:nvPr/>
-        </p:nvSpPr>
-        <p:spPr>
-          <a:xfrm>
-            <a:off x="6096000" y="2228003"/>
-            <a:ext cx="5422390" cy="3633047"/>
-          </a:xfrm>
-          <a:prstGeom prst="rect">
-            <a:avLst/>
-          </a:prstGeom>
-        </p:spPr>
-        <p:txBody>
-          <a:bodyPr vert="horz" lIns="91440" tIns="45720" rIns="91440" bIns="45720" rtlCol="0" anchor="ctr">
-            <a:normAutofit/>
-          </a:bodyPr>
-          <a:lstStyle>
-            <a:lvl1pPr marL="306000" indent="-306000" algn="l" defTabSz="457200" rtl="0" eaLnBrk="1" latinLnBrk="0" hangingPunct="1">
-              <a:spcBef>
-                <a:spcPct val="20000"/>
-              </a:spcBef>
-              <a:spcAft>
-                <a:spcPts val="600"/>
-              </a:spcAft>
-              <a:buClr>
-                <a:schemeClr val="accent2"/>
-              </a:buClr>
-              <a:buSzPct val="92000"/>
-              <a:buFont typeface="Wingdings 2" panose="05020102010507070707" pitchFamily="18" charset="2"/>
-              <a:buChar char=""/>
-              <a:defRPr sz="1800" kern="1200">
-                <a:solidFill>
-                  <a:schemeClr val="tx2"/>
-                </a:solidFill>
-                <a:latin typeface="+mn-lt"/>
-                <a:ea typeface="+mn-ea"/>
-                <a:cs typeface="+mn-cs"/>
-              </a:defRPr>
-            </a:lvl1pPr>
-            <a:lvl2pPr marL="630000" indent="-306000" algn="l" defTabSz="457200" rtl="0" eaLnBrk="1" latinLnBrk="0" hangingPunct="1">
-              <a:spcBef>
-                <a:spcPct val="20000"/>
-              </a:spcBef>
-              <a:spcAft>
-                <a:spcPts val="600"/>
-              </a:spcAft>
-              <a:buClr>
-                <a:schemeClr val="accent2"/>
-              </a:buClr>
-              <a:buSzPct val="92000"/>
-              <a:buFont typeface="Wingdings 2" panose="05020102010507070707" pitchFamily="18" charset="2"/>
-              <a:buChar char=""/>
-              <a:defRPr sz="1600" kern="1200">
-                <a:solidFill>
-                  <a:schemeClr val="tx2"/>
-                </a:solidFill>
-                <a:latin typeface="+mn-lt"/>
-                <a:ea typeface="+mn-ea"/>
-                <a:cs typeface="+mn-cs"/>
-              </a:defRPr>
-            </a:lvl2pPr>
-            <a:lvl3pPr marL="900000" indent="-270000" algn="l" defTabSz="457200" rtl="0" eaLnBrk="1" latinLnBrk="0" hangingPunct="1">
-              <a:spcBef>
-                <a:spcPct val="20000"/>
-              </a:spcBef>
-              <a:spcAft>
-                <a:spcPts val="600"/>
-              </a:spcAft>
-              <a:buClr>
-                <a:schemeClr val="accent2"/>
-              </a:buClr>
-              <a:buSzPct val="92000"/>
-              <a:buFont typeface="Wingdings 2" panose="05020102010507070707" pitchFamily="18" charset="2"/>
-              <a:buChar char=""/>
-              <a:defRPr sz="1400" kern="1200">
-                <a:solidFill>
-                  <a:schemeClr val="tx2"/>
-                </a:solidFill>
-                <a:latin typeface="+mn-lt"/>
-                <a:ea typeface="+mn-ea"/>
-                <a:cs typeface="+mn-cs"/>
-              </a:defRPr>
-            </a:lvl3pPr>
-            <a:lvl4pPr marL="1242000" indent="-234000" algn="l" defTabSz="457200" rtl="0" eaLnBrk="1" latinLnBrk="0" hangingPunct="1">
-              <a:spcBef>
-                <a:spcPct val="20000"/>
-              </a:spcBef>
-              <a:spcAft>
-                <a:spcPts val="600"/>
-              </a:spcAft>
-              <a:buClr>
-                <a:schemeClr val="accent2"/>
-              </a:buClr>
-              <a:buSzPct val="92000"/>
-              <a:buFont typeface="Wingdings 2" panose="05020102010507070707" pitchFamily="18" charset="2"/>
-              <a:buChar char=""/>
-              <a:defRPr sz="1200" kern="1200">
-                <a:solidFill>
-                  <a:schemeClr val="tx2"/>
-                </a:solidFill>
-                <a:latin typeface="+mn-lt"/>
-                <a:ea typeface="+mn-ea"/>
-                <a:cs typeface="+mn-cs"/>
-              </a:defRPr>
-            </a:lvl4pPr>
-            <a:lvl5pPr marL="1602000" indent="-234000" algn="l" defTabSz="457200" rtl="0" eaLnBrk="1" latinLnBrk="0" hangingPunct="1">
-              <a:spcBef>
-                <a:spcPct val="20000"/>
-              </a:spcBef>
-              <a:spcAft>
-                <a:spcPts val="600"/>
-              </a:spcAft>
-              <a:buClr>
-                <a:schemeClr val="accent2"/>
-              </a:buClr>
-              <a:buSzPct val="92000"/>
-              <a:buFont typeface="Wingdings 2" panose="05020102010507070707" pitchFamily="18" charset="2"/>
-              <a:buChar char=""/>
-              <a:defRPr sz="1200" kern="1200">
-                <a:solidFill>
-                  <a:schemeClr val="tx2"/>
-                </a:solidFill>
-                <a:latin typeface="+mn-lt"/>
-                <a:ea typeface="+mn-ea"/>
-                <a:cs typeface="+mn-cs"/>
-              </a:defRPr>
-            </a:lvl5pPr>
-            <a:lvl6pPr marL="1900000" indent="-228600" algn="l" defTabSz="457200" rtl="0" eaLnBrk="1" latinLnBrk="0" hangingPunct="1">
-              <a:spcBef>
-                <a:spcPct val="20000"/>
-              </a:spcBef>
-              <a:spcAft>
-                <a:spcPts val="600"/>
-              </a:spcAft>
-              <a:buClr>
-                <a:schemeClr val="accent2"/>
-              </a:buClr>
-              <a:buSzPct val="92000"/>
-              <a:buFont typeface="Wingdings 2" panose="05020102010507070707" pitchFamily="18" charset="2"/>
-              <a:buChar char=""/>
-              <a:defRPr sz="1200" kern="1200">
-                <a:solidFill>
-                  <a:schemeClr val="tx2"/>
-                </a:solidFill>
-                <a:latin typeface="+mn-lt"/>
-                <a:ea typeface="+mn-ea"/>
-                <a:cs typeface="+mn-cs"/>
-              </a:defRPr>
-            </a:lvl6pPr>
-            <a:lvl7pPr marL="2200000" indent="-228600" algn="l" defTabSz="457200" rtl="0" eaLnBrk="1" latinLnBrk="0" hangingPunct="1">
-              <a:spcBef>
-                <a:spcPct val="20000"/>
-              </a:spcBef>
-              <a:spcAft>
-                <a:spcPts val="600"/>
-              </a:spcAft>
-              <a:buClr>
-                <a:schemeClr val="accent2"/>
-              </a:buClr>
-              <a:buSzPct val="92000"/>
-              <a:buFont typeface="Wingdings 2" panose="05020102010507070707" pitchFamily="18" charset="2"/>
-              <a:buChar char=""/>
-              <a:defRPr sz="1200" kern="1200">
-                <a:solidFill>
-                  <a:schemeClr val="tx2"/>
-                </a:solidFill>
-                <a:latin typeface="+mn-lt"/>
-                <a:ea typeface="+mn-ea"/>
-                <a:cs typeface="+mn-cs"/>
-              </a:defRPr>
-            </a:lvl7pPr>
-            <a:lvl8pPr marL="2500000" indent="-228600" algn="l" defTabSz="457200" rtl="0" eaLnBrk="1" latinLnBrk="0" hangingPunct="1">
-              <a:spcBef>
-                <a:spcPct val="20000"/>
-              </a:spcBef>
-              <a:spcAft>
-                <a:spcPts val="600"/>
-              </a:spcAft>
-              <a:buClr>
-                <a:schemeClr val="accent2"/>
-              </a:buClr>
-              <a:buSzPct val="92000"/>
-              <a:buFont typeface="Wingdings 2" panose="05020102010507070707" pitchFamily="18" charset="2"/>
-              <a:buChar char=""/>
-              <a:defRPr sz="1200" kern="1200">
-                <a:solidFill>
-                  <a:schemeClr val="tx2"/>
-                </a:solidFill>
-                <a:latin typeface="+mn-lt"/>
-                <a:ea typeface="+mn-ea"/>
-                <a:cs typeface="+mn-cs"/>
-              </a:defRPr>
-            </a:lvl8pPr>
-            <a:lvl9pPr marL="2800000" indent="-228600" algn="l" defTabSz="457200" rtl="0" eaLnBrk="1" latinLnBrk="0" hangingPunct="1">
-              <a:spcBef>
-                <a:spcPct val="20000"/>
-              </a:spcBef>
-              <a:spcAft>
-                <a:spcPts val="600"/>
-              </a:spcAft>
-              <a:buClr>
-                <a:schemeClr val="accent2"/>
-              </a:buClr>
-              <a:buSzPct val="92000"/>
-              <a:buFont typeface="Wingdings 2" panose="05020102010507070707" pitchFamily="18" charset="2"/>
-              <a:buChar char=""/>
-              <a:defRPr sz="1200" kern="1200">
-                <a:solidFill>
-                  <a:schemeClr val="tx2"/>
-                </a:solidFill>
-                <a:latin typeface="+mn-lt"/>
-                <a:ea typeface="+mn-ea"/>
-                <a:cs typeface="+mn-cs"/>
-              </a:defRPr>
-            </a:lvl9pPr>
-          </a:lstStyle>
-          <a:p>
-            <a:pPr marL="0" indent="0">
-              <a:buNone/>
-            </a:pPr>
-            <a:r>
-              <a:rPr lang="en-GB" sz="1500" dirty="0"/>
-              <a:t>Example:</a:t>
-            </a:r>
-            <a:endParaRPr lang="en-GB" sz="1500" dirty="0">
-              <a:hlinkClick r:id="rId3">
-                <a:extLst>
-                  <a:ext uri="{A12FA001-AC4F-418D-AE19-62706E023703}">
-                    <ahyp:hlinkClr xmlns:ahyp="http://schemas.microsoft.com/office/drawing/2018/hyperlinkcolor" val="tx"/>
-                  </a:ext>
-                </a:extLst>
-              </a:hlinkClick>
-            </a:endParaRPr>
-          </a:p>
-          <a:p>
-            <a:pPr marL="0" indent="0">
-              <a:buNone/>
-            </a:pPr>
-            <a:r>
-              <a:rPr lang="en-GB" sz="1500" dirty="0">
+              <a:rPr lang="en-GB" dirty="0"/>
+              <a:t>Go to </a:t>
+            </a:r>
+            <a:r>
+              <a:rPr lang="en-GB" dirty="0">
                 <a:hlinkClick r:id="rId3">
                   <a:extLst>
                     <a:ext uri="{A12FA001-AC4F-418D-AE19-62706E023703}">
@@ -6771,12 +7645,75 @@
                   </a:extLst>
                 </a:hlinkClick>
               </a:rPr>
-              <a:t>https://www.oreilly.com/library/view/restful-java-web/9781788294041/1889f99d-f907-41c3-a0f0-925bbf1d3825.xhtml</a:t>
-            </a:r>
-            <a:endParaRPr lang="en-GB" sz="1500" dirty="0"/>
-          </a:p>
-        </p:txBody>
-      </p:sp>
+              <a:t>NodeJS Official Website</a:t>
+            </a:r>
+            <a:r>
+              <a:rPr lang="en-GB" dirty="0"/>
+              <a:t>.</a:t>
+            </a:r>
+          </a:p>
+          <a:p>
+            <a:pPr>
+              <a:buFont typeface="Arial" panose="020B0604020202020204" pitchFamily="34" charset="0"/>
+              <a:buChar char="•"/>
+            </a:pPr>
+            <a:r>
+              <a:rPr lang="en-GB" dirty="0"/>
+              <a:t>Download the latest stable version for your OS.</a:t>
+            </a:r>
+          </a:p>
+          <a:p>
+            <a:pPr>
+              <a:buFont typeface="Arial" panose="020B0604020202020204" pitchFamily="34" charset="0"/>
+              <a:buChar char="•"/>
+            </a:pPr>
+            <a:r>
+              <a:rPr lang="en-GB" dirty="0"/>
+              <a:t>Run the installer and verify installation with node -v in the terminal.</a:t>
+            </a:r>
+          </a:p>
+          <a:p>
+            <a:r>
+              <a:rPr lang="en-GB" b="1" dirty="0"/>
+              <a:t>NPM (Node Package Manager)</a:t>
+            </a:r>
+            <a:r>
+              <a:rPr lang="en-GB" dirty="0"/>
+              <a:t>: Automatically installed with Node.js. Allows for easy installation of libraries.</a:t>
+            </a:r>
+          </a:p>
+        </p:txBody>
+      </p:sp>
+      <p:pic>
+        <p:nvPicPr>
+          <p:cNvPr id="5" name="Picture 4">
+            <a:extLst>
+              <a:ext uri="{FF2B5EF4-FFF2-40B4-BE49-F238E27FC236}">
+                <a16:creationId xmlns:a16="http://schemas.microsoft.com/office/drawing/2014/main" id="{FEB270CD-37C9-A410-4A9C-76439EE2B6A6}"/>
+              </a:ext>
+            </a:extLst>
+          </p:cNvPr>
+          <p:cNvPicPr>
+            <a:picLocks noChangeAspect="1"/>
+          </p:cNvPicPr>
+          <p:nvPr/>
+        </p:nvPicPr>
+        <p:blipFill>
+          <a:blip r:embed="rId4"/>
+          <a:stretch>
+            <a:fillRect/>
+          </a:stretch>
+        </p:blipFill>
+        <p:spPr>
+          <a:xfrm>
+            <a:off x="7070515" y="2917511"/>
+            <a:ext cx="3644900" cy="2222500"/>
+          </a:xfrm>
+          <a:prstGeom prst="rect">
+            <a:avLst/>
+          </a:prstGeom>
+        </p:spPr>
+      </p:pic>
     </p:spTree>
     <p:extLst>
       <p:ext uri="{BB962C8B-B14F-4D97-AF65-F5344CB8AC3E}">
@@ -6843,7 +7780,7 @@
           <a:p>
             <a:r>
               <a:rPr lang="en-GB" dirty="0"/>
-              <a:t>Types of HTTP Requests</a:t>
+              <a:t>Running a Simple JavaScript File</a:t>
             </a:r>
           </a:p>
         </p:txBody>
@@ -6878,56 +7815,17 @@
           <a:p>
             <a:r>
               <a:rPr lang="en-GB" b="1" dirty="0"/>
-              <a:t>GET</a:t>
-            </a:r>
-            <a:r>
-              <a:rPr lang="en-GB" dirty="0"/>
-              <a:t>: Retrieves data (read-only).</a:t>
-            </a:r>
-          </a:p>
-          <a:p>
-            <a:r>
-              <a:rPr lang="en-GB" b="1" dirty="0"/>
-              <a:t>POST</a:t>
-            </a:r>
-            <a:r>
-              <a:rPr lang="en-GB" dirty="0"/>
-              <a:t>: Sends new data to the server.</a:t>
-            </a:r>
-          </a:p>
-          <a:p>
-            <a:r>
-              <a:rPr lang="en-GB" b="1" dirty="0"/>
-              <a:t>PUT</a:t>
-            </a:r>
-            <a:r>
-              <a:rPr lang="en-GB" dirty="0"/>
-              <a:t>: Updates existing data.</a:t>
-            </a:r>
-          </a:p>
-          <a:p>
-            <a:r>
-              <a:rPr lang="en-GB" b="1" dirty="0"/>
-              <a:t>DELETE</a:t>
-            </a:r>
-            <a:r>
-              <a:rPr lang="en-GB" dirty="0"/>
-              <a:t>: Removes data.</a:t>
-            </a:r>
-            <a:br>
-              <a:rPr lang="en-GB" dirty="0"/>
-            </a:br>
-            <a:br>
-              <a:rPr lang="en-GB" dirty="0"/>
-            </a:br>
-            <a:r>
-              <a:rPr lang="en-GB" b="1" dirty="0"/>
-              <a:t>Example</a:t>
-            </a:r>
-            <a:r>
-              <a:rPr lang="en-GB" dirty="0"/>
-              <a:t>:</a:t>
-            </a:r>
+              <a:t>File Example</a:t>
+            </a:r>
+            <a:r>
+              <a:rPr lang="en-GB" dirty="0"/>
+              <a:t>: </a:t>
+            </a:r>
+            <a:r>
+              <a:rPr lang="en-GB" dirty="0" err="1"/>
+              <a:t>index.js</a:t>
+            </a:r>
+            <a:endParaRPr lang="en-GB" dirty="0"/>
           </a:p>
           <a:p>
             <a:pPr>
@@ -6935,8 +7833,30 @@
               <a:buChar char="•"/>
             </a:pPr>
             <a:r>
-              <a:rPr lang="en-GB" dirty="0"/>
-              <a:t>GET request to fetch weather data from an API.</a:t>
+              <a:rPr lang="en-GB" b="1" dirty="0"/>
+              <a:t>How to Run</a:t>
+            </a:r>
+            <a:r>
+              <a:rPr lang="en-GB" dirty="0"/>
+              <a:t>:</a:t>
+            </a:r>
+            <a:br>
+              <a:rPr lang="en-GB" dirty="0"/>
+            </a:br>
+            <a:br>
+              <a:rPr lang="en-GB" dirty="0"/>
+            </a:br>
+            <a:r>
+              <a:rPr lang="en-GB" dirty="0"/>
+              <a:t>Open terminal, navigate to the directory containing </a:t>
+            </a:r>
+            <a:r>
+              <a:rPr lang="en-GB" dirty="0" err="1"/>
+              <a:t>index.js</a:t>
+            </a:r>
+            <a:r>
+              <a:rPr lang="en-GB" dirty="0"/>
+              <a:t>.</a:t>
             </a:r>
           </a:p>
           <a:p>
@@ -6946,7 +7866,15 @@
             </a:pPr>
             <a:r>
               <a:rPr lang="en-GB" dirty="0"/>
-              <a:t>POST request to submit a form.</a:t>
+              <a:t>Run the command: node </a:t>
+            </a:r>
+            <a:r>
+              <a:rPr lang="en-GB" dirty="0" err="1"/>
+              <a:t>index.js</a:t>
+            </a:r>
+            <a:r>
+              <a:rPr lang="en-GB" dirty="0"/>
+              <a:t>.</a:t>
             </a:r>
           </a:p>
           <a:p>
@@ -6954,6 +7882,36 @@
           </a:p>
         </p:txBody>
       </p:sp>
+      <p:pic>
+        <p:nvPicPr>
+          <p:cNvPr id="5" name="Picture 4">
+            <a:extLst>
+              <a:ext uri="{FF2B5EF4-FFF2-40B4-BE49-F238E27FC236}">
+                <a16:creationId xmlns:a16="http://schemas.microsoft.com/office/drawing/2014/main" id="{96CAAC81-A93C-0EF3-E7F9-E84FABFC06F8}"/>
+              </a:ext>
+            </a:extLst>
+          </p:cNvPr>
+          <p:cNvPicPr>
+            <a:picLocks noChangeAspect="1"/>
+          </p:cNvPicPr>
+          <p:nvPr/>
+        </p:nvPicPr>
+        <p:blipFill>
+          <a:blip r:embed="rId3"/>
+          <a:stretch>
+            <a:fillRect/>
+          </a:stretch>
+        </p:blipFill>
+        <p:spPr>
+          <a:xfrm>
+            <a:off x="6096000" y="3429000"/>
+            <a:ext cx="4013200" cy="596900"/>
+          </a:xfrm>
+          <a:prstGeom prst="rect">
+            <a:avLst/>
+          </a:prstGeom>
+        </p:spPr>
+      </p:pic>
     </p:spTree>
     <p:extLst>
       <p:ext uri="{BB962C8B-B14F-4D97-AF65-F5344CB8AC3E}">
@@ -7020,7 +7978,7 @@
           <a:p>
             <a:r>
               <a:rPr lang="en-GB" dirty="0"/>
-              <a:t>What is Postman?</a:t>
+              <a:t>Debugging Simple Scripts and Functions</a:t>
             </a:r>
           </a:p>
         </p:txBody>
@@ -7043,13 +8001,13 @@
         </p:nvSpPr>
         <p:spPr>
           <a:xfrm>
-            <a:off x="581193" y="2190326"/>
-            <a:ext cx="5422390" cy="3633047"/>
+            <a:off x="581192" y="2190326"/>
+            <a:ext cx="5588379" cy="3938016"/>
           </a:xfrm>
         </p:spPr>
         <p:txBody>
           <a:bodyPr anchor="ctr">
-            <a:normAutofit/>
+            <a:normAutofit lnSpcReduction="10000"/>
           </a:bodyPr>
           <a:lstStyle/>
           <a:p>
@@ -7059,11 +8017,18 @@
             </a:pPr>
             <a:r>
               <a:rPr lang="en-GB" b="1" dirty="0"/>
-              <a:t>Postman</a:t>
-            </a:r>
-            <a:r>
-              <a:rPr lang="en-GB" dirty="0"/>
-              <a:t> is a powerful tool for testing APIs and making HTTP requests.</a:t>
+              <a:t>How to Start Debugging</a:t>
+            </a:r>
+            <a:r>
+              <a:rPr lang="en-GB" dirty="0"/>
+              <a:t>:</a:t>
+            </a:r>
+            <a:br>
+              <a:rPr lang="en-GB" dirty="0"/>
+            </a:br>
+            <a:r>
+              <a:rPr lang="en-GB" dirty="0"/>
+              <a:t>Use the Run | Start Debugging command in VSCode to start debugging.</a:t>
             </a:r>
           </a:p>
           <a:p>
@@ -7073,7 +8038,7 @@
             </a:pPr>
             <a:r>
               <a:rPr lang="en-GB" b="1" dirty="0"/>
-              <a:t>Key Features</a:t>
+              <a:t>Key Debugging Actions</a:t>
             </a:r>
             <a:r>
               <a:rPr lang="en-GB" dirty="0"/>
@@ -7087,27 +8052,7 @@
             </a:br>
             <a:r>
               <a:rPr lang="en-GB" dirty="0"/>
-              <a:t>Send different types of requests (GET, POST, PUT).</a:t>
-            </a:r>
-            <a:br>
-              <a:rPr lang="en-GB" dirty="0"/>
-            </a:br>
-            <a:br>
-              <a:rPr lang="en-GB" dirty="0"/>
-            </a:br>
-            <a:r>
-              <a:rPr lang="en-GB" dirty="0"/>
-              <a:t>Test and visualize responses.</a:t>
-            </a:r>
-            <a:br>
-              <a:rPr lang="en-GB" dirty="0"/>
-            </a:br>
-            <a:br>
-              <a:rPr lang="en-GB" dirty="0"/>
-            </a:br>
-            <a:r>
-              <a:rPr lang="en-GB" dirty="0"/>
-              <a:t>Set headers, parameters, and body data.</a:t>
+              <a:t>step over: executes the function then stops</a:t>
             </a:r>
           </a:p>
           <a:p>
@@ -7116,71 +8061,52 @@
               <a:buChar char="•"/>
             </a:pPr>
             <a:r>
-              <a:rPr lang="en-GB" b="1" dirty="0"/>
-              <a:t>Why use </a:t>
-            </a:r>
-            <a:r>
-              <a:rPr lang="en-GB" b="1" dirty="0" err="1"/>
-              <a:t>it?</a:t>
-            </a:r>
-            <a:r>
-              <a:rPr lang="en-GB" dirty="0" err="1"/>
-              <a:t>Makes</a:t>
-            </a:r>
-            <a:r>
-              <a:rPr lang="en-GB" dirty="0"/>
-              <a:t> working with APIs easier without writing code.</a:t>
-            </a:r>
-          </a:p>
-        </p:txBody>
-      </p:sp>
-      <p:pic>
-        <p:nvPicPr>
-          <p:cNvPr id="1026" name="Picture 2">
-            <a:extLst>
-              <a:ext uri="{FF2B5EF4-FFF2-40B4-BE49-F238E27FC236}">
-                <a16:creationId xmlns:a16="http://schemas.microsoft.com/office/drawing/2014/main" id="{F6487D03-C702-934E-5AF9-83465B16A3FD}"/>
-              </a:ext>
-            </a:extLst>
-          </p:cNvPr>
-          <p:cNvPicPr>
-            <a:picLocks noChangeAspect="1" noChangeArrowheads="1"/>
-          </p:cNvPicPr>
-          <p:nvPr/>
-        </p:nvPicPr>
-        <p:blipFill>
-          <a:blip r:embed="rId3">
-            <a:extLst>
-              <a:ext uri="{28A0092B-C50C-407E-A947-70E740481C1C}">
-                <a14:useLocalDpi xmlns:a14="http://schemas.microsoft.com/office/drawing/2010/main" val="0"/>
-              </a:ext>
-            </a:extLst>
-          </a:blip>
-          <a:srcRect/>
-          <a:stretch>
-            <a:fillRect/>
-          </a:stretch>
-        </p:blipFill>
-        <p:spPr bwMode="auto">
-          <a:xfrm>
-            <a:off x="6670920" y="3096846"/>
-            <a:ext cx="4548066" cy="1380293"/>
-          </a:xfrm>
-          <a:prstGeom prst="rect">
-            <a:avLst/>
-          </a:prstGeom>
-          <a:noFill/>
-          <a:extLst>
-            <a:ext uri="{909E8E84-426E-40DD-AFC4-6F175D3DCCD1}">
-              <a14:hiddenFill xmlns:a14="http://schemas.microsoft.com/office/drawing/2010/main">
-                <a:solidFill>
-                  <a:srgbClr val="FFFFFF"/>
-                </a:solidFill>
-              </a14:hiddenFill>
-            </a:ext>
-          </a:extLst>
-        </p:spPr>
-      </p:pic>
+              <a:rPr lang="en-GB" dirty="0"/>
+              <a:t>step into: steps into the function</a:t>
+            </a:r>
+          </a:p>
+          <a:p>
+            <a:pPr>
+              <a:buFont typeface="Arial" panose="020B0604020202020204" pitchFamily="34" charset="0"/>
+              <a:buChar char="•"/>
+            </a:pPr>
+            <a:r>
+              <a:rPr lang="en-GB" dirty="0"/>
+              <a:t>step out: runs to the end of the function then stops</a:t>
+            </a:r>
+          </a:p>
+          <a:p>
+            <a:pPr>
+              <a:buFont typeface="Arial" panose="020B0604020202020204" pitchFamily="34" charset="0"/>
+              <a:buChar char="•"/>
+            </a:pPr>
+            <a:r>
+              <a:rPr lang="en-GB" dirty="0"/>
+              <a:t>continue: Continue until breakpoint.</a:t>
+            </a:r>
+          </a:p>
+          <a:p>
+            <a:pPr>
+              <a:buFont typeface="Arial" panose="020B0604020202020204" pitchFamily="34" charset="0"/>
+              <a:buChar char="•"/>
+            </a:pPr>
+            <a:r>
+              <a:rPr lang="en-GB" dirty="0"/>
+              <a:t>stop: stops the application and debugging</a:t>
+            </a:r>
+            <a:br>
+              <a:rPr lang="en-GB" dirty="0"/>
+            </a:br>
+            <a:br>
+              <a:rPr lang="en-GB" dirty="0"/>
+            </a:br>
+            <a:r>
+              <a:rPr lang="en-GB" dirty="0"/>
+              <a:t>demo…</a:t>
+            </a:r>
+          </a:p>
+        </p:txBody>
+      </p:sp>
     </p:spTree>
     <p:extLst>
       <p:ext uri="{BB962C8B-B14F-4D97-AF65-F5344CB8AC3E}">
@@ -7247,7 +8173,7 @@
           <a:p>
             <a:r>
               <a:rPr lang="en-GB" dirty="0"/>
-              <a:t>Using Postman for Basic HTTP Requests</a:t>
+              <a:t>ES6/7 vs Traditional JavaScript</a:t>
             </a:r>
           </a:p>
         </p:txBody>
@@ -7280,59 +8206,13 @@
           </a:bodyPr>
           <a:lstStyle/>
           <a:p>
-            <a:pPr>
-              <a:buFont typeface="Arial" panose="020B0604020202020204" pitchFamily="34" charset="0"/>
-              <a:buChar char="•"/>
-            </a:pPr>
             <a:r>
               <a:rPr lang="en-GB" b="1" dirty="0"/>
-              <a:t>Step 1</a:t>
-            </a:r>
-            <a:r>
-              <a:rPr lang="en-GB" dirty="0"/>
-              <a:t>: Install Postman from the official website.</a:t>
-            </a:r>
-          </a:p>
-          <a:p>
-            <a:pPr>
-              <a:buFont typeface="Arial" panose="020B0604020202020204" pitchFamily="34" charset="0"/>
-              <a:buChar char="•"/>
-            </a:pPr>
-            <a:r>
-              <a:rPr lang="en-GB" b="1" dirty="0"/>
-              <a:t>Step 2</a:t>
-            </a:r>
-            <a:r>
-              <a:rPr lang="en-GB" dirty="0"/>
-              <a:t>: Create a new request and set the method (GET, POST).</a:t>
-            </a:r>
-          </a:p>
-          <a:p>
-            <a:pPr>
-              <a:buFont typeface="Arial" panose="020B0604020202020204" pitchFamily="34" charset="0"/>
-              <a:buChar char="•"/>
-            </a:pPr>
-            <a:r>
-              <a:rPr lang="en-GB" b="1" dirty="0"/>
-              <a:t>Step 3</a:t>
-            </a:r>
-            <a:r>
-              <a:rPr lang="en-GB" dirty="0"/>
-              <a:t>: Enter the URL of the API endpoint.</a:t>
-            </a:r>
-          </a:p>
-          <a:p>
-            <a:pPr>
-              <a:buFont typeface="Arial" panose="020B0604020202020204" pitchFamily="34" charset="0"/>
-              <a:buChar char="•"/>
-            </a:pPr>
-            <a:r>
-              <a:rPr lang="en-GB" b="1" dirty="0"/>
-              <a:t>Step 4</a:t>
-            </a:r>
-            <a:r>
-              <a:rPr lang="en-GB" dirty="0"/>
-              <a:t>: Send the request and view the response (in JSON or other formats).</a:t>
+              <a:t>Differences</a:t>
+            </a:r>
+            <a:r>
+              <a:rPr lang="en-GB" dirty="0"/>
+              <a:t>:</a:t>
             </a:r>
             <a:br>
               <a:rPr lang="en-GB" dirty="0"/>
@@ -7342,7 +8222,27 @@
             </a:br>
             <a:r>
               <a:rPr lang="en-GB" dirty="0"/>
-              <a:t>demo…</a:t>
+              <a:t>Syntax improvements (arrow functions, modules).</a:t>
+            </a:r>
+            <a:br>
+              <a:rPr lang="en-GB" dirty="0"/>
+            </a:br>
+            <a:br>
+              <a:rPr lang="en-GB" dirty="0"/>
+            </a:br>
+            <a:r>
+              <a:rPr lang="en-GB" dirty="0"/>
+              <a:t>More readable and concise code.</a:t>
+            </a:r>
+            <a:br>
+              <a:rPr lang="en-GB" dirty="0"/>
+            </a:br>
+            <a:br>
+              <a:rPr lang="en-GB" dirty="0"/>
+            </a:br>
+            <a:r>
+              <a:rPr lang="en-GB" dirty="0"/>
+              <a:t>Focus on better handling of asynchronous operations (e.g., async/await).</a:t>
             </a:r>
           </a:p>
         </p:txBody>
@@ -7413,7 +8313,7 @@
           <a:p>
             <a:r>
               <a:rPr lang="en-GB" dirty="0"/>
-              <a:t>What is JSON?</a:t>
+              <a:t>Async/Await</a:t>
             </a:r>
           </a:p>
         </p:txBody>
@@ -7452,41 +8352,41 @@
             </a:pPr>
             <a:r>
               <a:rPr lang="en-GB" b="1" dirty="0"/>
-              <a:t>JavaScript Object Notation (JSON)</a:t>
-            </a:r>
-            <a:r>
-              <a:rPr lang="en-GB" dirty="0"/>
-              <a:t> is a lightweight format for data exchange.</a:t>
-            </a:r>
-          </a:p>
-          <a:p>
-            <a:pPr marL="742950" lvl="1" indent="-285750">
-              <a:buFont typeface="Arial" panose="020B0604020202020204" pitchFamily="34" charset="0"/>
-              <a:buChar char="•"/>
-            </a:pPr>
-            <a:r>
-              <a:rPr lang="en-GB" dirty="0"/>
-              <a:t>Syntax: key-value pairs (like JavaScript objects).</a:t>
-            </a:r>
-          </a:p>
-          <a:p>
-            <a:pPr marL="742950" lvl="1" indent="-285750">
-              <a:buFont typeface="Arial" panose="020B0604020202020204" pitchFamily="34" charset="0"/>
-              <a:buChar char="•"/>
-            </a:pPr>
-            <a:r>
-              <a:rPr lang="en-GB" dirty="0"/>
-              <a:t>Easy to read and write.</a:t>
+              <a:t>What is Async/Await?</a:t>
+            </a:r>
+            <a:r>
+              <a:rPr lang="en-GB" dirty="0"/>
+              <a:t>:</a:t>
+            </a:r>
+            <a:br>
+              <a:rPr lang="en-GB" dirty="0"/>
+            </a:br>
+            <a:br>
+              <a:rPr lang="en-GB" dirty="0"/>
+            </a:br>
+            <a:r>
+              <a:rPr lang="en-GB" dirty="0"/>
+              <a:t>An easier way to work with asynchronous code.</a:t>
+            </a:r>
+          </a:p>
+          <a:p>
+            <a:r>
+              <a:rPr lang="en-GB" b="1" dirty="0"/>
+              <a:t>Example</a:t>
+            </a:r>
+            <a:r>
+              <a:rPr lang="en-GB" dirty="0"/>
+              <a:t>:</a:t>
             </a:r>
           </a:p>
         </p:txBody>
       </p:sp>
       <p:pic>
         <p:nvPicPr>
-          <p:cNvPr id="5" name="Picture 4" descr="A screenshot of a computer&#10;&#10;Description automatically generated">
+          <p:cNvPr id="6" name="Picture 5" descr="A computer code on a black background&#10;&#10;Description automatically generated">
             <a:extLst>
               <a:ext uri="{FF2B5EF4-FFF2-40B4-BE49-F238E27FC236}">
-                <a16:creationId xmlns:a16="http://schemas.microsoft.com/office/drawing/2014/main" id="{64810ECC-3868-FF81-8D46-E00A54DBDA1D}"/>
+                <a16:creationId xmlns:a16="http://schemas.microsoft.com/office/drawing/2014/main" id="{EBFBB2EB-C3E9-F4FE-3F28-EC4252848182}"/>
               </a:ext>
             </a:extLst>
           </p:cNvPr>
@@ -7503,8 +8403,8 @@
         </p:blipFill>
         <p:spPr>
           <a:xfrm>
-            <a:off x="7341044" y="3413051"/>
-            <a:ext cx="2273300" cy="1384300"/>
+            <a:off x="5912667" y="3429000"/>
+            <a:ext cx="5698140" cy="1537945"/>
           </a:xfrm>
           <a:prstGeom prst="rect">
             <a:avLst/>
@@ -7577,7 +8477,7 @@
           <a:p>
             <a:r>
               <a:rPr lang="en-GB" dirty="0"/>
-              <a:t>JSON Requests with the Fetch Method</a:t>
+              <a:t>Default Function Parameters</a:t>
             </a:r>
           </a:p>
         </p:txBody>
@@ -7606,94 +8506,51 @@
         </p:spPr>
         <p:txBody>
           <a:bodyPr anchor="ctr">
-            <a:normAutofit lnSpcReduction="10000"/>
+            <a:normAutofit/>
           </a:bodyPr>
           <a:lstStyle/>
           <a:p>
             <a:r>
               <a:rPr lang="en-GB" b="1" dirty="0"/>
-              <a:t>Fetch</a:t>
-            </a:r>
-            <a:r>
-              <a:rPr lang="en-GB" dirty="0"/>
-              <a:t>: A built-in JavaScript method for making HTTP requests.</a:t>
-            </a:r>
-          </a:p>
-          <a:p>
-            <a:r>
-              <a:rPr lang="en-GB" b="1" dirty="0"/>
-              <a:t>Basic Structure</a:t>
+              <a:t>Definition</a:t>
+            </a:r>
+            <a:r>
+              <a:rPr lang="en-GB" dirty="0"/>
+              <a:t>: </a:t>
             </a:r>
             <a:br>
-              <a:rPr lang="en-GB" b="1" dirty="0"/>
+              <a:rPr lang="en-GB" dirty="0"/>
             </a:br>
             <a:br>
+              <a:rPr lang="en-GB" dirty="0"/>
+            </a:br>
+            <a:r>
+              <a:rPr lang="en-GB" dirty="0"/>
+              <a:t>Set default values for parameters in functions.</a:t>
+            </a:r>
+            <a:br>
+              <a:rPr lang="en-GB" dirty="0"/>
+            </a:br>
+            <a:endParaRPr lang="en-GB" dirty="0"/>
+          </a:p>
+          <a:p>
+            <a:r>
               <a:rPr lang="en-GB" b="1" dirty="0"/>
-            </a:br>
-            <a:br>
-              <a:rPr lang="en-GB" b="1" dirty="0"/>
-            </a:br>
-            <a:br>
-              <a:rPr lang="en-GB" b="1" dirty="0"/>
-            </a:br>
-            <a:br>
-              <a:rPr lang="en-GB" b="1" dirty="0"/>
-            </a:br>
-            <a:endParaRPr lang="en-GB" b="1" dirty="0"/>
-          </a:p>
-          <a:p>
-            <a:pPr>
-              <a:buFont typeface="Arial" panose="020B0604020202020204" pitchFamily="34" charset="0"/>
-              <a:buChar char="•"/>
-            </a:pPr>
-            <a:r>
-              <a:rPr lang="en-GB" b="1" dirty="0"/>
-              <a:t>How it works</a:t>
+              <a:t>Example</a:t>
             </a:r>
             <a:r>
               <a:rPr lang="en-GB" dirty="0"/>
               <a:t>:</a:t>
             </a:r>
-          </a:p>
-          <a:p>
-            <a:pPr marL="742950" lvl="1" indent="-285750">
-              <a:buFont typeface="Arial" panose="020B0604020202020204" pitchFamily="34" charset="0"/>
-              <a:buChar char="•"/>
-            </a:pPr>
-            <a:r>
-              <a:rPr lang="en-GB" dirty="0"/>
-              <a:t>Fetch makes a request and receives a response.</a:t>
-            </a:r>
-          </a:p>
-          <a:p>
-            <a:pPr marL="742950" lvl="1" indent="-285750">
-              <a:buFont typeface="Arial" panose="020B0604020202020204" pitchFamily="34" charset="0"/>
-              <a:buChar char="•"/>
-            </a:pPr>
-            <a:r>
-              <a:rPr lang="en-GB" dirty="0"/>
-              <a:t>The .</a:t>
-            </a:r>
-            <a:r>
-              <a:rPr lang="en-GB" dirty="0" err="1"/>
-              <a:t>json</a:t>
-            </a:r>
-            <a:r>
-              <a:rPr lang="en-GB" dirty="0"/>
-              <a:t>() method parses the JSON data.</a:t>
-            </a:r>
-          </a:p>
-          <a:p>
-            <a:endParaRPr lang="en-GB" dirty="0"/>
           </a:p>
         </p:txBody>
       </p:sp>
       <p:pic>
         <p:nvPicPr>
-          <p:cNvPr id="6" name="Picture 5" descr="A black background with white text&#10;&#10;Description automatically generated">
+          <p:cNvPr id="5" name="Picture 4" descr="A computer screen with text&#10;&#10;Description automatically generated with medium confidence">
             <a:extLst>
               <a:ext uri="{FF2B5EF4-FFF2-40B4-BE49-F238E27FC236}">
-                <a16:creationId xmlns:a16="http://schemas.microsoft.com/office/drawing/2014/main" id="{C5D6F12F-D9AA-93EE-0557-26F5708F1D98}"/>
+                <a16:creationId xmlns:a16="http://schemas.microsoft.com/office/drawing/2014/main" id="{842D6F65-7C39-80B4-47AC-31E5677B930A}"/>
               </a:ext>
             </a:extLst>
           </p:cNvPr>
@@ -7710,8 +8567,8 @@
         </p:blipFill>
         <p:spPr>
           <a:xfrm>
-            <a:off x="1316209" y="3269512"/>
-            <a:ext cx="4292600" cy="1041400"/>
+            <a:off x="6493684" y="3405618"/>
+            <a:ext cx="4343400" cy="1460500"/>
           </a:xfrm>
           <a:prstGeom prst="rect">
             <a:avLst/>

</xml_diff>